<commit_message>
revise data config and python code change into INT8
</commit_message>
<xml_diff>
--- a/EC_FINAL_PROJECT-unknown/EC_FINAL_PROJECT-unknown/doc/structure.pptx
+++ b/EC_FINAL_PROJECT-unknown/EC_FINAL_PROJECT-unknown/doc/structure.pptx
@@ -5,7 +5,7 @@
     <p:sldMasterId id="2147483648" r:id="rId1"/>
   </p:sldMasterIdLst>
   <p:notesMasterIdLst>
-    <p:notesMasterId r:id="rId9"/>
+    <p:notesMasterId r:id="rId8"/>
   </p:notesMasterIdLst>
   <p:sldIdLst>
     <p:sldId id="257" r:id="rId2"/>
@@ -14,7 +14,6 @@
     <p:sldId id="259" r:id="rId5"/>
     <p:sldId id="260" r:id="rId6"/>
     <p:sldId id="262" r:id="rId7"/>
-    <p:sldId id="263" r:id="rId8"/>
   </p:sldIdLst>
   <p:sldSz cx="12192000" cy="6858000"/>
   <p:notesSz cx="6858000" cy="9144000"/>
@@ -113,6 +112,11 @@
       </a:defRPr>
     </a:lvl9pPr>
   </p:defaultTextStyle>
+  <p:extLst>
+    <p:ext uri="{EFAFB233-063F-42B5-8137-9DF3F51BA10A}">
+      <p15:sldGuideLst xmlns:p15="http://schemas.microsoft.com/office/powerpoint/2012/main"/>
+    </p:ext>
+  </p:extLst>
 </p:presentation>
 </file>
 
@@ -198,7 +202,7 @@
           <a:p>
             <a:fld id="{EADC719D-6B30-4568-8E05-2AABF35D3ACB}" type="datetimeFigureOut">
               <a:rPr lang="zh-TW" altLang="en-US" smtClean="0"/>
-              <a:t>2022/11/25</a:t>
+              <a:t>2022/11/29</a:t>
             </a:fld>
             <a:endParaRPr lang="zh-TW" altLang="en-US"/>
           </a:p>
@@ -707,90 +711,6 @@
 </p:notes>
 </file>
 
-<file path=ppt/notesSlides/notesSlide3.xml><?xml version="1.0" encoding="utf-8"?>
-<p:notes xmlns:a="http://schemas.openxmlformats.org/drawingml/2006/main" xmlns:r="http://schemas.openxmlformats.org/officeDocument/2006/relationships" xmlns:p="http://schemas.openxmlformats.org/presentationml/2006/main">
-  <p:cSld>
-    <p:spTree>
-      <p:nvGrpSpPr>
-        <p:cNvPr id="1" name=""/>
-        <p:cNvGrpSpPr/>
-        <p:nvPr/>
-      </p:nvGrpSpPr>
-      <p:grpSpPr>
-        <a:xfrm>
-          <a:off x="0" y="0"/>
-          <a:ext cx="0" cy="0"/>
-          <a:chOff x="0" y="0"/>
-          <a:chExt cx="0" cy="0"/>
-        </a:xfrm>
-      </p:grpSpPr>
-      <p:sp>
-        <p:nvSpPr>
-          <p:cNvPr id="2" name="投影片影像版面配置區 1"/>
-          <p:cNvSpPr>
-            <a:spLocks noGrp="1" noRot="1" noChangeAspect="1"/>
-          </p:cNvSpPr>
-          <p:nvPr>
-            <p:ph type="sldImg"/>
-          </p:nvPr>
-        </p:nvSpPr>
-        <p:spPr/>
-      </p:sp>
-      <p:sp>
-        <p:nvSpPr>
-          <p:cNvPr id="3" name="備忘稿版面配置區 2"/>
-          <p:cNvSpPr>
-            <a:spLocks noGrp="1"/>
-          </p:cNvSpPr>
-          <p:nvPr>
-            <p:ph type="body" idx="1"/>
-          </p:nvPr>
-        </p:nvSpPr>
-        <p:spPr/>
-        <p:txBody>
-          <a:bodyPr/>
-          <a:lstStyle/>
-          <a:p>
-            <a:endParaRPr lang="zh-TW" altLang="en-US" dirty="0"/>
-          </a:p>
-        </p:txBody>
-      </p:sp>
-      <p:sp>
-        <p:nvSpPr>
-          <p:cNvPr id="4" name="投影片編號版面配置區 3"/>
-          <p:cNvSpPr>
-            <a:spLocks noGrp="1"/>
-          </p:cNvSpPr>
-          <p:nvPr>
-            <p:ph type="sldNum" sz="quarter" idx="5"/>
-          </p:nvPr>
-        </p:nvSpPr>
-        <p:spPr/>
-        <p:txBody>
-          <a:bodyPr/>
-          <a:lstStyle/>
-          <a:p>
-            <a:fld id="{8000AC90-C065-4706-B020-37A6E6FF53AC}" type="slidenum">
-              <a:rPr lang="zh-TW" altLang="en-US" smtClean="0"/>
-              <a:t>7</a:t>
-            </a:fld>
-            <a:endParaRPr lang="zh-TW" altLang="en-US"/>
-          </a:p>
-        </p:txBody>
-      </p:sp>
-    </p:spTree>
-    <p:extLst>
-      <p:ext uri="{BB962C8B-B14F-4D97-AF65-F5344CB8AC3E}">
-        <p14:creationId xmlns:p14="http://schemas.microsoft.com/office/powerpoint/2010/main" val="68619406"/>
-      </p:ext>
-    </p:extLst>
-  </p:cSld>
-  <p:clrMapOvr>
-    <a:masterClrMapping/>
-  </p:clrMapOvr>
-</p:notes>
-</file>
-
 <file path=ppt/slideLayouts/slideLayout1.xml><?xml version="1.0" encoding="utf-8"?>
 <p:sldLayout xmlns:a="http://schemas.openxmlformats.org/drawingml/2006/main" xmlns:r="http://schemas.openxmlformats.org/officeDocument/2006/relationships" xmlns:p="http://schemas.openxmlformats.org/presentationml/2006/main" type="title" preserve="1">
   <p:cSld name="標題投影片">
@@ -938,7 +858,7 @@
           <a:p>
             <a:fld id="{77B1EA69-60A7-4E64-B68F-993F39D4EE0C}" type="datetimeFigureOut">
               <a:rPr lang="zh-TW" altLang="en-US" smtClean="0"/>
-              <a:t>2022/11/25</a:t>
+              <a:t>2022/11/29</a:t>
             </a:fld>
             <a:endParaRPr lang="zh-TW" altLang="en-US"/>
           </a:p>
@@ -1136,7 +1056,7 @@
           <a:p>
             <a:fld id="{77B1EA69-60A7-4E64-B68F-993F39D4EE0C}" type="datetimeFigureOut">
               <a:rPr lang="zh-TW" altLang="en-US" smtClean="0"/>
-              <a:t>2022/11/25</a:t>
+              <a:t>2022/11/29</a:t>
             </a:fld>
             <a:endParaRPr lang="zh-TW" altLang="en-US"/>
           </a:p>
@@ -1344,7 +1264,7 @@
           <a:p>
             <a:fld id="{77B1EA69-60A7-4E64-B68F-993F39D4EE0C}" type="datetimeFigureOut">
               <a:rPr lang="zh-TW" altLang="en-US" smtClean="0"/>
-              <a:t>2022/11/25</a:t>
+              <a:t>2022/11/29</a:t>
             </a:fld>
             <a:endParaRPr lang="zh-TW" altLang="en-US"/>
           </a:p>
@@ -1542,7 +1462,7 @@
           <a:p>
             <a:fld id="{77B1EA69-60A7-4E64-B68F-993F39D4EE0C}" type="datetimeFigureOut">
               <a:rPr lang="zh-TW" altLang="en-US" smtClean="0"/>
-              <a:t>2022/11/25</a:t>
+              <a:t>2022/11/29</a:t>
             </a:fld>
             <a:endParaRPr lang="zh-TW" altLang="en-US"/>
           </a:p>
@@ -1817,7 +1737,7 @@
           <a:p>
             <a:fld id="{77B1EA69-60A7-4E64-B68F-993F39D4EE0C}" type="datetimeFigureOut">
               <a:rPr lang="zh-TW" altLang="en-US" smtClean="0"/>
-              <a:t>2022/11/25</a:t>
+              <a:t>2022/11/29</a:t>
             </a:fld>
             <a:endParaRPr lang="zh-TW" altLang="en-US"/>
           </a:p>
@@ -2082,7 +2002,7 @@
           <a:p>
             <a:fld id="{77B1EA69-60A7-4E64-B68F-993F39D4EE0C}" type="datetimeFigureOut">
               <a:rPr lang="zh-TW" altLang="en-US" smtClean="0"/>
-              <a:t>2022/11/25</a:t>
+              <a:t>2022/11/29</a:t>
             </a:fld>
             <a:endParaRPr lang="zh-TW" altLang="en-US"/>
           </a:p>
@@ -2494,7 +2414,7 @@
           <a:p>
             <a:fld id="{77B1EA69-60A7-4E64-B68F-993F39D4EE0C}" type="datetimeFigureOut">
               <a:rPr lang="zh-TW" altLang="en-US" smtClean="0"/>
-              <a:t>2022/11/25</a:t>
+              <a:t>2022/11/29</a:t>
             </a:fld>
             <a:endParaRPr lang="zh-TW" altLang="en-US"/>
           </a:p>
@@ -2635,7 +2555,7 @@
           <a:p>
             <a:fld id="{77B1EA69-60A7-4E64-B68F-993F39D4EE0C}" type="datetimeFigureOut">
               <a:rPr lang="zh-TW" altLang="en-US" smtClean="0"/>
-              <a:t>2022/11/25</a:t>
+              <a:t>2022/11/29</a:t>
             </a:fld>
             <a:endParaRPr lang="zh-TW" altLang="en-US"/>
           </a:p>
@@ -2748,7 +2668,7 @@
           <a:p>
             <a:fld id="{77B1EA69-60A7-4E64-B68F-993F39D4EE0C}" type="datetimeFigureOut">
               <a:rPr lang="zh-TW" altLang="en-US" smtClean="0"/>
-              <a:t>2022/11/25</a:t>
+              <a:t>2022/11/29</a:t>
             </a:fld>
             <a:endParaRPr lang="zh-TW" altLang="en-US"/>
           </a:p>
@@ -3059,7 +2979,7 @@
           <a:p>
             <a:fld id="{77B1EA69-60A7-4E64-B68F-993F39D4EE0C}" type="datetimeFigureOut">
               <a:rPr lang="zh-TW" altLang="en-US" smtClean="0"/>
-              <a:t>2022/11/25</a:t>
+              <a:t>2022/11/29</a:t>
             </a:fld>
             <a:endParaRPr lang="zh-TW" altLang="en-US"/>
           </a:p>
@@ -3347,7 +3267,7 @@
           <a:p>
             <a:fld id="{77B1EA69-60A7-4E64-B68F-993F39D4EE0C}" type="datetimeFigureOut">
               <a:rPr lang="zh-TW" altLang="en-US" smtClean="0"/>
-              <a:t>2022/11/25</a:t>
+              <a:t>2022/11/29</a:t>
             </a:fld>
             <a:endParaRPr lang="zh-TW" altLang="en-US"/>
           </a:p>
@@ -3588,7 +3508,7 @@
           <a:p>
             <a:fld id="{77B1EA69-60A7-4E64-B68F-993F39D4EE0C}" type="datetimeFigureOut">
               <a:rPr lang="zh-TW" altLang="en-US" smtClean="0"/>
-              <a:t>2022/11/25</a:t>
+              <a:t>2022/11/29</a:t>
             </a:fld>
             <a:endParaRPr lang="zh-TW" altLang="en-US"/>
           </a:p>
@@ -4564,131 +4484,6 @@
       </p:grpSp>
       <p:grpSp>
         <p:nvGrpSpPr>
-          <p:cNvPr id="20" name="群組 19">
-            <a:extLst>
-              <a:ext uri="{FF2B5EF4-FFF2-40B4-BE49-F238E27FC236}">
-                <a16:creationId xmlns:a16="http://schemas.microsoft.com/office/drawing/2014/main" id="{5B739E31-1951-4FB2-86CE-7BDC0886D807}"/>
-              </a:ext>
-            </a:extLst>
-          </p:cNvPr>
-          <p:cNvGrpSpPr/>
-          <p:nvPr/>
-        </p:nvGrpSpPr>
-        <p:grpSpPr>
-          <a:xfrm>
-            <a:off x="5695056" y="3593401"/>
-            <a:ext cx="1122430" cy="1044564"/>
-            <a:chOff x="4271606" y="2308236"/>
-            <a:chExt cx="1196322" cy="1377073"/>
-          </a:xfrm>
-          <a:solidFill>
-            <a:srgbClr val="FFC000"/>
-          </a:solidFill>
-        </p:grpSpPr>
-        <p:sp>
-          <p:nvSpPr>
-            <p:cNvPr id="21" name="矩形: 圓角 20">
-              <a:extLst>
-                <a:ext uri="{FF2B5EF4-FFF2-40B4-BE49-F238E27FC236}">
-                  <a16:creationId xmlns:a16="http://schemas.microsoft.com/office/drawing/2014/main" id="{AB45E1DA-F0A4-4783-91E7-383CB88E9BB3}"/>
-                </a:ext>
-              </a:extLst>
-            </p:cNvPr>
-            <p:cNvSpPr/>
-            <p:nvPr/>
-          </p:nvSpPr>
-          <p:spPr>
-            <a:xfrm>
-              <a:off x="4271606" y="2308236"/>
-              <a:ext cx="1196322" cy="1377073"/>
-            </a:xfrm>
-            <a:prstGeom prst="roundRect">
-              <a:avLst/>
-            </a:prstGeom>
-            <a:grpFill/>
-            <a:ln w="38100">
-              <a:solidFill>
-                <a:schemeClr val="accent4">
-                  <a:lumMod val="50000"/>
-                </a:schemeClr>
-              </a:solidFill>
-            </a:ln>
-          </p:spPr>
-          <p:style>
-            <a:lnRef idx="2">
-              <a:schemeClr val="accent1">
-                <a:shade val="50000"/>
-              </a:schemeClr>
-            </a:lnRef>
-            <a:fillRef idx="1">
-              <a:schemeClr val="accent1"/>
-            </a:fillRef>
-            <a:effectRef idx="0">
-              <a:schemeClr val="accent1"/>
-            </a:effectRef>
-            <a:fontRef idx="minor">
-              <a:schemeClr val="lt1"/>
-            </a:fontRef>
-          </p:style>
-          <p:txBody>
-            <a:bodyPr rtlCol="0" anchor="ctr"/>
-            <a:lstStyle/>
-            <a:p>
-              <a:pPr algn="ctr"/>
-              <a:endParaRPr lang="zh-TW" altLang="en-US" dirty="0"/>
-            </a:p>
-          </p:txBody>
-        </p:sp>
-        <p:sp>
-          <p:nvSpPr>
-            <p:cNvPr id="22" name="文字方塊 21">
-              <a:extLst>
-                <a:ext uri="{FF2B5EF4-FFF2-40B4-BE49-F238E27FC236}">
-                  <a16:creationId xmlns:a16="http://schemas.microsoft.com/office/drawing/2014/main" id="{A865E61D-88B5-4876-B15D-9F2158D0847F}"/>
-                </a:ext>
-              </a:extLst>
-            </p:cNvPr>
-            <p:cNvSpPr txBox="1"/>
-            <p:nvPr/>
-          </p:nvSpPr>
-          <p:spPr>
-            <a:xfrm>
-              <a:off x="4337382" y="2402910"/>
-              <a:ext cx="1064770" cy="344887"/>
-            </a:xfrm>
-            <a:prstGeom prst="rect">
-              <a:avLst/>
-            </a:prstGeom>
-            <a:grpFill/>
-            <a:ln>
-              <a:noFill/>
-            </a:ln>
-          </p:spPr>
-          <p:txBody>
-            <a:bodyPr wrap="square" rtlCol="0">
-              <a:spAutoFit/>
-            </a:bodyPr>
-            <a:lstStyle/>
-            <a:p>
-              <a:r>
-                <a:rPr lang="en-US" altLang="zh-TW" sz="1100" dirty="0" err="1"/>
-                <a:t>Main</a:t>
-              </a:r>
-              <a:r>
-                <a:rPr lang="en-US" altLang="zh-TW" sz="1100" err="1"/>
-                <a:t>_</a:t>
-              </a:r>
-              <a:r>
-                <a:rPr lang="en-US" altLang="zh-TW" sz="1100"/>
-                <a:t>controll</a:t>
-              </a:r>
-              <a:endParaRPr lang="zh-TW" altLang="en-US" sz="1100" dirty="0"/>
-            </a:p>
-          </p:txBody>
-        </p:sp>
-      </p:grpSp>
-      <p:grpSp>
-        <p:nvGrpSpPr>
           <p:cNvPr id="23" name="群組 22">
             <a:extLst>
               <a:ext uri="{FF2B5EF4-FFF2-40B4-BE49-F238E27FC236}">
@@ -5208,9 +5003,9 @@
           <p:grpSpPr>
             <a:xfrm>
               <a:off x="1357190" y="1356036"/>
-              <a:ext cx="1484272" cy="360072"/>
+              <a:ext cx="1609178" cy="360072"/>
               <a:chOff x="1350704" y="1626107"/>
-              <a:chExt cx="1484272" cy="360072"/>
+              <a:chExt cx="1609178" cy="360072"/>
             </a:xfrm>
           </p:grpSpPr>
           <p:sp>
@@ -5316,7 +5111,7 @@
             <p:spPr>
               <a:xfrm>
                 <a:off x="1658948" y="1626107"/>
-                <a:ext cx="1176028" cy="276999"/>
+                <a:ext cx="1300934" cy="276999"/>
               </a:xfrm>
               <a:prstGeom prst="rect">
                 <a:avLst/>
@@ -5331,7 +5126,7 @@
               <a:p>
                 <a:r>
                   <a:rPr lang="en-US" altLang="zh-TW" sz="1200" dirty="0" err="1"/>
-                  <a:t>Num_generator</a:t>
+                  <a:t>Num_generations</a:t>
                 </a:r>
                 <a:endParaRPr lang="zh-TW" altLang="en-US" sz="1200" dirty="0"/>
               </a:p>
@@ -6210,151 +6005,6 @@
         </p:grpSp>
         <p:grpSp>
           <p:nvGrpSpPr>
-            <p:cNvPr id="47" name="群組 46">
-              <a:extLst>
-                <a:ext uri="{FF2B5EF4-FFF2-40B4-BE49-F238E27FC236}">
-                  <a16:creationId xmlns:a16="http://schemas.microsoft.com/office/drawing/2014/main" id="{146EA816-04DC-4C13-B631-3FE8FDA40211}"/>
-                </a:ext>
-              </a:extLst>
-            </p:cNvPr>
-            <p:cNvGrpSpPr/>
-            <p:nvPr/>
-          </p:nvGrpSpPr>
-          <p:grpSpPr>
-            <a:xfrm>
-              <a:off x="1372260" y="3526574"/>
-              <a:ext cx="1369299" cy="360072"/>
-              <a:chOff x="1350704" y="1626107"/>
-              <a:chExt cx="1369299" cy="360072"/>
-            </a:xfrm>
-          </p:grpSpPr>
-          <p:sp>
-            <p:nvSpPr>
-              <p:cNvPr id="48" name="箭號: 五邊形 47">
-                <a:extLst>
-                  <a:ext uri="{FF2B5EF4-FFF2-40B4-BE49-F238E27FC236}">
-                    <a16:creationId xmlns:a16="http://schemas.microsoft.com/office/drawing/2014/main" id="{B71089BE-9E6D-431E-BF43-4E4DB724B6CE}"/>
-                  </a:ext>
-                </a:extLst>
-              </p:cNvPr>
-              <p:cNvSpPr/>
-              <p:nvPr/>
-            </p:nvSpPr>
-            <p:spPr>
-              <a:xfrm>
-                <a:off x="1350704" y="1725368"/>
-                <a:ext cx="387927" cy="260811"/>
-              </a:xfrm>
-              <a:prstGeom prst="homePlate">
-                <a:avLst/>
-              </a:prstGeom>
-              <a:solidFill>
-                <a:schemeClr val="accent3">
-                  <a:lumMod val="40000"/>
-                  <a:lumOff val="60000"/>
-                </a:schemeClr>
-              </a:solidFill>
-            </p:spPr>
-            <p:style>
-              <a:lnRef idx="2">
-                <a:schemeClr val="accent1">
-                  <a:shade val="50000"/>
-                </a:schemeClr>
-              </a:lnRef>
-              <a:fillRef idx="1">
-                <a:schemeClr val="accent1"/>
-              </a:fillRef>
-              <a:effectRef idx="0">
-                <a:schemeClr val="accent1"/>
-              </a:effectRef>
-              <a:fontRef idx="minor">
-                <a:schemeClr val="lt1"/>
-              </a:fontRef>
-            </p:style>
-            <p:txBody>
-              <a:bodyPr rtlCol="0" anchor="ctr"/>
-              <a:lstStyle/>
-              <a:p>
-                <a:pPr algn="ctr"/>
-                <a:endParaRPr lang="zh-TW" altLang="en-US"/>
-              </a:p>
-            </p:txBody>
-          </p:sp>
-          <p:cxnSp>
-            <p:nvCxnSpPr>
-              <p:cNvPr id="49" name="直線接點 48">
-                <a:extLst>
-                  <a:ext uri="{FF2B5EF4-FFF2-40B4-BE49-F238E27FC236}">
-                    <a16:creationId xmlns:a16="http://schemas.microsoft.com/office/drawing/2014/main" id="{043F9441-BA1E-41EF-A95B-ABCEC2700167}"/>
-                  </a:ext>
-                </a:extLst>
-              </p:cNvPr>
-              <p:cNvCxnSpPr/>
-              <p:nvPr/>
-            </p:nvCxnSpPr>
-            <p:spPr>
-              <a:xfrm flipH="1">
-                <a:off x="1720167" y="1861995"/>
-                <a:ext cx="999836" cy="1"/>
-              </a:xfrm>
-              <a:prstGeom prst="line">
-                <a:avLst/>
-              </a:prstGeom>
-            </p:spPr>
-            <p:style>
-              <a:lnRef idx="3">
-                <a:schemeClr val="dk1"/>
-              </a:lnRef>
-              <a:fillRef idx="0">
-                <a:schemeClr val="dk1"/>
-              </a:fillRef>
-              <a:effectRef idx="2">
-                <a:schemeClr val="dk1"/>
-              </a:effectRef>
-              <a:fontRef idx="minor">
-                <a:schemeClr val="tx1"/>
-              </a:fontRef>
-            </p:style>
-          </p:cxnSp>
-          <p:sp>
-            <p:nvSpPr>
-              <p:cNvPr id="50" name="文字方塊 49">
-                <a:extLst>
-                  <a:ext uri="{FF2B5EF4-FFF2-40B4-BE49-F238E27FC236}">
-                    <a16:creationId xmlns:a16="http://schemas.microsoft.com/office/drawing/2014/main" id="{3AF441CF-21B0-4020-9879-8F1D36F189E8}"/>
-                  </a:ext>
-                </a:extLst>
-              </p:cNvPr>
-              <p:cNvSpPr txBox="1"/>
-              <p:nvPr/>
-            </p:nvSpPr>
-            <p:spPr>
-              <a:xfrm>
-                <a:off x="1658948" y="1626107"/>
-                <a:ext cx="899798" cy="276999"/>
-              </a:xfrm>
-              <a:prstGeom prst="rect">
-                <a:avLst/>
-              </a:prstGeom>
-              <a:noFill/>
-            </p:spPr>
-            <p:txBody>
-              <a:bodyPr wrap="none" rtlCol="0">
-                <a:spAutoFit/>
-              </a:bodyPr>
-              <a:lstStyle/>
-              <a:p>
-                <a:r>
-                  <a:rPr lang="en-US" altLang="zh-TW" sz="1200" dirty="0" err="1"/>
-                  <a:t>Sigma_max</a:t>
-                </a:r>
-                <a:endParaRPr lang="zh-TW" altLang="en-US" sz="1200" dirty="0"/>
-              </a:p>
-            </p:txBody>
-          </p:sp>
-        </p:grpSp>
-        <p:grpSp>
-          <p:nvGrpSpPr>
             <p:cNvPr id="51" name="群組 50">
               <a:extLst>
                 <a:ext uri="{FF2B5EF4-FFF2-40B4-BE49-F238E27FC236}">
@@ -6368,9 +6018,9 @@
           <p:grpSpPr>
             <a:xfrm>
               <a:off x="1380983" y="3890930"/>
-              <a:ext cx="1369299" cy="360072"/>
+              <a:ext cx="1599175" cy="360072"/>
               <a:chOff x="1350704" y="1626107"/>
-              <a:chExt cx="1369299" cy="360072"/>
+              <a:chExt cx="1599175" cy="360072"/>
             </a:xfrm>
           </p:grpSpPr>
           <p:sp>
@@ -6476,7 +6126,7 @@
             <p:spPr>
               <a:xfrm>
                 <a:off x="1658948" y="1626107"/>
-                <a:ext cx="875561" cy="276999"/>
+                <a:ext cx="1290931" cy="276999"/>
               </a:xfrm>
               <a:prstGeom prst="rect">
                 <a:avLst/>
@@ -6491,9 +6141,9 @@
               <a:p>
                 <a:r>
                   <a:rPr lang="en-US" altLang="zh-TW" sz="1200" dirty="0" err="1"/>
-                  <a:t>Sigma_min</a:t>
+                  <a:t>crossoverFraction</a:t>
                 </a:r>
-                <a:endParaRPr lang="zh-TW" altLang="en-US" sz="1200" dirty="0"/>
+                <a:endParaRPr lang="zh-TW" altLang="en-US" sz="1000" dirty="0"/>
               </a:p>
             </p:txBody>
           </p:sp>
@@ -9329,9 +8979,9 @@
           <p:grpSpPr>
             <a:xfrm>
               <a:off x="1357190" y="1356036"/>
-              <a:ext cx="1484272" cy="360072"/>
+              <a:ext cx="1609178" cy="360072"/>
               <a:chOff x="1350704" y="1626107"/>
-              <a:chExt cx="1484272" cy="360072"/>
+              <a:chExt cx="1609178" cy="360072"/>
             </a:xfrm>
           </p:grpSpPr>
           <p:sp>
@@ -9437,7 +9087,7 @@
             <p:spPr>
               <a:xfrm>
                 <a:off x="1658948" y="1626107"/>
-                <a:ext cx="1176028" cy="276999"/>
+                <a:ext cx="1300934" cy="276999"/>
               </a:xfrm>
               <a:prstGeom prst="rect">
                 <a:avLst/>
@@ -9452,7 +9102,7 @@
               <a:p>
                 <a:r>
                   <a:rPr lang="en-US" altLang="zh-TW" sz="1200" dirty="0" err="1"/>
-                  <a:t>Num_generator</a:t>
+                  <a:t>Num_generations</a:t>
                 </a:r>
                 <a:endParaRPr lang="zh-TW" altLang="en-US" sz="1200" dirty="0"/>
               </a:p>
@@ -11187,9 +10837,9 @@
           <p:grpSpPr>
             <a:xfrm>
               <a:off x="1357190" y="1356036"/>
-              <a:ext cx="1484272" cy="360072"/>
+              <a:ext cx="1609178" cy="360072"/>
               <a:chOff x="1350704" y="1626107"/>
-              <a:chExt cx="1484272" cy="360072"/>
+              <a:chExt cx="1609178" cy="360072"/>
             </a:xfrm>
           </p:grpSpPr>
           <p:sp>
@@ -11295,7 +10945,7 @@
             <p:spPr>
               <a:xfrm>
                 <a:off x="1658948" y="1626107"/>
-                <a:ext cx="1176028" cy="276999"/>
+                <a:ext cx="1300934" cy="276999"/>
               </a:xfrm>
               <a:prstGeom prst="rect">
                 <a:avLst/>
@@ -11310,7 +10960,7 @@
               <a:p>
                 <a:r>
                   <a:rPr lang="en-US" altLang="zh-TW" sz="1200" dirty="0" err="1"/>
-                  <a:t>Num_generator</a:t>
+                  <a:t>Num_generations</a:t>
                 </a:r>
                 <a:endParaRPr lang="zh-TW" altLang="en-US" sz="1200" dirty="0"/>
               </a:p>
@@ -13779,1947 +13429,6 @@
 </p:sld>
 </file>
 
-<file path=ppt/slides/slide7.xml><?xml version="1.0" encoding="utf-8"?>
-<p:sld xmlns:a="http://schemas.openxmlformats.org/drawingml/2006/main" xmlns:r="http://schemas.openxmlformats.org/officeDocument/2006/relationships" xmlns:p="http://schemas.openxmlformats.org/presentationml/2006/main">
-  <p:cSld>
-    <p:spTree>
-      <p:nvGrpSpPr>
-        <p:cNvPr id="1" name=""/>
-        <p:cNvGrpSpPr/>
-        <p:nvPr/>
-      </p:nvGrpSpPr>
-      <p:grpSpPr>
-        <a:xfrm>
-          <a:off x="0" y="0"/>
-          <a:ext cx="0" cy="0"/>
-          <a:chOff x="0" y="0"/>
-          <a:chExt cx="0" cy="0"/>
-        </a:xfrm>
-      </p:grpSpPr>
-      <p:grpSp>
-        <p:nvGrpSpPr>
-          <p:cNvPr id="64" name="群組 63">
-            <a:extLst>
-              <a:ext uri="{FF2B5EF4-FFF2-40B4-BE49-F238E27FC236}">
-                <a16:creationId xmlns:a16="http://schemas.microsoft.com/office/drawing/2014/main" id="{2A2348D1-B79C-430D-AF11-46BD9323C386}"/>
-              </a:ext>
-            </a:extLst>
-          </p:cNvPr>
-          <p:cNvGrpSpPr/>
-          <p:nvPr/>
-        </p:nvGrpSpPr>
-        <p:grpSpPr>
-          <a:xfrm>
-            <a:off x="1357190" y="1115891"/>
-            <a:ext cx="5761611" cy="4776357"/>
-            <a:chOff x="1357190" y="1115891"/>
-            <a:chExt cx="5761611" cy="4776357"/>
-          </a:xfrm>
-        </p:grpSpPr>
-        <p:grpSp>
-          <p:nvGrpSpPr>
-            <p:cNvPr id="65" name="群組 64">
-              <a:extLst>
-                <a:ext uri="{FF2B5EF4-FFF2-40B4-BE49-F238E27FC236}">
-                  <a16:creationId xmlns:a16="http://schemas.microsoft.com/office/drawing/2014/main" id="{34F61E15-A8D9-4E1E-846F-30EA2800E8C5}"/>
-                </a:ext>
-              </a:extLst>
-            </p:cNvPr>
-            <p:cNvGrpSpPr/>
-            <p:nvPr/>
-          </p:nvGrpSpPr>
-          <p:grpSpPr>
-            <a:xfrm>
-              <a:off x="5741966" y="4333928"/>
-              <a:ext cx="1369299" cy="260811"/>
-              <a:chOff x="5741966" y="2748833"/>
-              <a:chExt cx="1369299" cy="260811"/>
-            </a:xfrm>
-          </p:grpSpPr>
-          <p:sp>
-            <p:nvSpPr>
-              <p:cNvPr id="121" name="箭號: 五邊形 120">
-                <a:extLst>
-                  <a:ext uri="{FF2B5EF4-FFF2-40B4-BE49-F238E27FC236}">
-                    <a16:creationId xmlns:a16="http://schemas.microsoft.com/office/drawing/2014/main" id="{E12928C0-7E76-47AD-B958-FF323C000243}"/>
-                  </a:ext>
-                </a:extLst>
-              </p:cNvPr>
-              <p:cNvSpPr/>
-              <p:nvPr/>
-            </p:nvSpPr>
-            <p:spPr>
-              <a:xfrm>
-                <a:off x="5741966" y="2748833"/>
-                <a:ext cx="387927" cy="260811"/>
-              </a:xfrm>
-              <a:prstGeom prst="homePlate">
-                <a:avLst/>
-              </a:prstGeom>
-              <a:solidFill>
-                <a:schemeClr val="accent3">
-                  <a:lumMod val="40000"/>
-                  <a:lumOff val="60000"/>
-                </a:schemeClr>
-              </a:solidFill>
-            </p:spPr>
-            <p:style>
-              <a:lnRef idx="2">
-                <a:schemeClr val="accent1">
-                  <a:shade val="50000"/>
-                </a:schemeClr>
-              </a:lnRef>
-              <a:fillRef idx="1">
-                <a:schemeClr val="accent1"/>
-              </a:fillRef>
-              <a:effectRef idx="0">
-                <a:schemeClr val="accent1"/>
-              </a:effectRef>
-              <a:fontRef idx="minor">
-                <a:schemeClr val="lt1"/>
-              </a:fontRef>
-            </p:style>
-            <p:txBody>
-              <a:bodyPr rtlCol="0" anchor="ctr"/>
-              <a:lstStyle/>
-              <a:p>
-                <a:pPr algn="ctr"/>
-                <a:endParaRPr lang="zh-TW" altLang="en-US"/>
-              </a:p>
-            </p:txBody>
-          </p:sp>
-          <p:cxnSp>
-            <p:nvCxnSpPr>
-              <p:cNvPr id="122" name="直線接點 121">
-                <a:extLst>
-                  <a:ext uri="{FF2B5EF4-FFF2-40B4-BE49-F238E27FC236}">
-                    <a16:creationId xmlns:a16="http://schemas.microsoft.com/office/drawing/2014/main" id="{03A0909F-2A4D-448B-B8BB-23D744EC7646}"/>
-                  </a:ext>
-                </a:extLst>
-              </p:cNvPr>
-              <p:cNvCxnSpPr/>
-              <p:nvPr/>
-            </p:nvCxnSpPr>
-            <p:spPr>
-              <a:xfrm flipH="1">
-                <a:off x="6111429" y="2885460"/>
-                <a:ext cx="999836" cy="1"/>
-              </a:xfrm>
-              <a:prstGeom prst="line">
-                <a:avLst/>
-              </a:prstGeom>
-            </p:spPr>
-            <p:style>
-              <a:lnRef idx="3">
-                <a:schemeClr val="dk1"/>
-              </a:lnRef>
-              <a:fillRef idx="0">
-                <a:schemeClr val="dk1"/>
-              </a:fillRef>
-              <a:effectRef idx="2">
-                <a:schemeClr val="dk1"/>
-              </a:effectRef>
-              <a:fontRef idx="minor">
-                <a:schemeClr val="tx1"/>
-              </a:fontRef>
-            </p:style>
-          </p:cxnSp>
-        </p:grpSp>
-        <p:grpSp>
-          <p:nvGrpSpPr>
-            <p:cNvPr id="66" name="群組 65">
-              <a:extLst>
-                <a:ext uri="{FF2B5EF4-FFF2-40B4-BE49-F238E27FC236}">
-                  <a16:creationId xmlns:a16="http://schemas.microsoft.com/office/drawing/2014/main" id="{1551C092-65C2-43E1-93DD-B4B2CC9C57A3}"/>
-                </a:ext>
-              </a:extLst>
-            </p:cNvPr>
-            <p:cNvGrpSpPr/>
-            <p:nvPr/>
-          </p:nvGrpSpPr>
-          <p:grpSpPr>
-            <a:xfrm>
-              <a:off x="5749502" y="3101062"/>
-              <a:ext cx="1369299" cy="260811"/>
-              <a:chOff x="5741966" y="2748833"/>
-              <a:chExt cx="1369299" cy="260811"/>
-            </a:xfrm>
-          </p:grpSpPr>
-          <p:sp>
-            <p:nvSpPr>
-              <p:cNvPr id="118" name="箭號: 五邊形 117">
-                <a:extLst>
-                  <a:ext uri="{FF2B5EF4-FFF2-40B4-BE49-F238E27FC236}">
-                    <a16:creationId xmlns:a16="http://schemas.microsoft.com/office/drawing/2014/main" id="{8CFD09E7-B67F-4F2B-9547-D95744F28D21}"/>
-                  </a:ext>
-                </a:extLst>
-              </p:cNvPr>
-              <p:cNvSpPr/>
-              <p:nvPr/>
-            </p:nvSpPr>
-            <p:spPr>
-              <a:xfrm>
-                <a:off x="5741966" y="2748833"/>
-                <a:ext cx="387927" cy="260811"/>
-              </a:xfrm>
-              <a:prstGeom prst="homePlate">
-                <a:avLst/>
-              </a:prstGeom>
-              <a:solidFill>
-                <a:schemeClr val="accent3">
-                  <a:lumMod val="40000"/>
-                  <a:lumOff val="60000"/>
-                </a:schemeClr>
-              </a:solidFill>
-            </p:spPr>
-            <p:style>
-              <a:lnRef idx="2">
-                <a:schemeClr val="accent1">
-                  <a:shade val="50000"/>
-                </a:schemeClr>
-              </a:lnRef>
-              <a:fillRef idx="1">
-                <a:schemeClr val="accent1"/>
-              </a:fillRef>
-              <a:effectRef idx="0">
-                <a:schemeClr val="accent1"/>
-              </a:effectRef>
-              <a:fontRef idx="minor">
-                <a:schemeClr val="lt1"/>
-              </a:fontRef>
-            </p:style>
-            <p:txBody>
-              <a:bodyPr rtlCol="0" anchor="ctr"/>
-              <a:lstStyle/>
-              <a:p>
-                <a:pPr algn="ctr"/>
-                <a:endParaRPr lang="zh-TW" altLang="en-US"/>
-              </a:p>
-            </p:txBody>
-          </p:sp>
-          <p:cxnSp>
-            <p:nvCxnSpPr>
-              <p:cNvPr id="119" name="直線接點 118">
-                <a:extLst>
-                  <a:ext uri="{FF2B5EF4-FFF2-40B4-BE49-F238E27FC236}">
-                    <a16:creationId xmlns:a16="http://schemas.microsoft.com/office/drawing/2014/main" id="{198B4276-D0AF-4763-948C-B823706ADAD8}"/>
-                  </a:ext>
-                </a:extLst>
-              </p:cNvPr>
-              <p:cNvCxnSpPr/>
-              <p:nvPr/>
-            </p:nvCxnSpPr>
-            <p:spPr>
-              <a:xfrm flipH="1">
-                <a:off x="6111429" y="2885460"/>
-                <a:ext cx="999836" cy="1"/>
-              </a:xfrm>
-              <a:prstGeom prst="line">
-                <a:avLst/>
-              </a:prstGeom>
-            </p:spPr>
-            <p:style>
-              <a:lnRef idx="3">
-                <a:schemeClr val="dk1"/>
-              </a:lnRef>
-              <a:fillRef idx="0">
-                <a:schemeClr val="dk1"/>
-              </a:fillRef>
-              <a:effectRef idx="2">
-                <a:schemeClr val="dk1"/>
-              </a:effectRef>
-              <a:fontRef idx="minor">
-                <a:schemeClr val="tx1"/>
-              </a:fontRef>
-            </p:style>
-          </p:cxnSp>
-        </p:grpSp>
-        <p:sp>
-          <p:nvSpPr>
-            <p:cNvPr id="67" name="文字方塊 66">
-              <a:extLst>
-                <a:ext uri="{FF2B5EF4-FFF2-40B4-BE49-F238E27FC236}">
-                  <a16:creationId xmlns:a16="http://schemas.microsoft.com/office/drawing/2014/main" id="{5D5EDFCF-ABF0-45C8-B576-A7E2CF7B15BA}"/>
-                </a:ext>
-              </a:extLst>
-            </p:cNvPr>
-            <p:cNvSpPr txBox="1"/>
-            <p:nvPr/>
-          </p:nvSpPr>
-          <p:spPr>
-            <a:xfrm>
-              <a:off x="4011092" y="1356036"/>
-              <a:ext cx="561244" cy="369332"/>
-            </a:xfrm>
-            <a:prstGeom prst="rect">
-              <a:avLst/>
-            </a:prstGeom>
-            <a:solidFill>
-              <a:schemeClr val="accent3">
-                <a:lumMod val="40000"/>
-                <a:lumOff val="60000"/>
-              </a:schemeClr>
-            </a:solidFill>
-            <a:ln>
-              <a:solidFill>
-                <a:schemeClr val="tx1"/>
-              </a:solidFill>
-            </a:ln>
-          </p:spPr>
-          <p:txBody>
-            <a:bodyPr wrap="none" rtlCol="0">
-              <a:spAutoFit/>
-            </a:bodyPr>
-            <a:lstStyle/>
-            <a:p>
-              <a:r>
-                <a:rPr lang="en-US" altLang="zh-TW" dirty="0"/>
-                <a:t>TOP</a:t>
-              </a:r>
-              <a:endParaRPr lang="zh-TW" altLang="en-US" dirty="0"/>
-            </a:p>
-          </p:txBody>
-        </p:sp>
-        <p:grpSp>
-          <p:nvGrpSpPr>
-            <p:cNvPr id="68" name="群組 67">
-              <a:extLst>
-                <a:ext uri="{FF2B5EF4-FFF2-40B4-BE49-F238E27FC236}">
-                  <a16:creationId xmlns:a16="http://schemas.microsoft.com/office/drawing/2014/main" id="{36AB04B4-E364-4DC9-9BC3-2EF1A7D4FE27}"/>
-                </a:ext>
-              </a:extLst>
-            </p:cNvPr>
-            <p:cNvGrpSpPr/>
-            <p:nvPr/>
-          </p:nvGrpSpPr>
-          <p:grpSpPr>
-            <a:xfrm>
-              <a:off x="1357190" y="1356036"/>
-              <a:ext cx="1484272" cy="360072"/>
-              <a:chOff x="1350704" y="1626107"/>
-              <a:chExt cx="1484272" cy="360072"/>
-            </a:xfrm>
-          </p:grpSpPr>
-          <p:sp>
-            <p:nvSpPr>
-              <p:cNvPr id="115" name="箭號: 五邊形 114">
-                <a:extLst>
-                  <a:ext uri="{FF2B5EF4-FFF2-40B4-BE49-F238E27FC236}">
-                    <a16:creationId xmlns:a16="http://schemas.microsoft.com/office/drawing/2014/main" id="{10EFAB39-6507-4B77-A6DA-3E25F9F2699C}"/>
-                  </a:ext>
-                </a:extLst>
-              </p:cNvPr>
-              <p:cNvSpPr/>
-              <p:nvPr/>
-            </p:nvSpPr>
-            <p:spPr>
-              <a:xfrm>
-                <a:off x="1350704" y="1725368"/>
-                <a:ext cx="387927" cy="260811"/>
-              </a:xfrm>
-              <a:prstGeom prst="homePlate">
-                <a:avLst/>
-              </a:prstGeom>
-              <a:solidFill>
-                <a:schemeClr val="accent3">
-                  <a:lumMod val="40000"/>
-                  <a:lumOff val="60000"/>
-                </a:schemeClr>
-              </a:solidFill>
-            </p:spPr>
-            <p:style>
-              <a:lnRef idx="2">
-                <a:schemeClr val="accent1">
-                  <a:shade val="50000"/>
-                </a:schemeClr>
-              </a:lnRef>
-              <a:fillRef idx="1">
-                <a:schemeClr val="accent1"/>
-              </a:fillRef>
-              <a:effectRef idx="0">
-                <a:schemeClr val="accent1"/>
-              </a:effectRef>
-              <a:fontRef idx="minor">
-                <a:schemeClr val="lt1"/>
-              </a:fontRef>
-            </p:style>
-            <p:txBody>
-              <a:bodyPr rtlCol="0" anchor="ctr"/>
-              <a:lstStyle/>
-              <a:p>
-                <a:pPr algn="ctr"/>
-                <a:endParaRPr lang="zh-TW" altLang="en-US"/>
-              </a:p>
-            </p:txBody>
-          </p:sp>
-          <p:cxnSp>
-            <p:nvCxnSpPr>
-              <p:cNvPr id="116" name="直線接點 115">
-                <a:extLst>
-                  <a:ext uri="{FF2B5EF4-FFF2-40B4-BE49-F238E27FC236}">
-                    <a16:creationId xmlns:a16="http://schemas.microsoft.com/office/drawing/2014/main" id="{EFDFB779-2718-47BD-A809-0799F046FE46}"/>
-                  </a:ext>
-                </a:extLst>
-              </p:cNvPr>
-              <p:cNvCxnSpPr/>
-              <p:nvPr/>
-            </p:nvCxnSpPr>
-            <p:spPr>
-              <a:xfrm flipH="1">
-                <a:off x="1720167" y="1861995"/>
-                <a:ext cx="999836" cy="1"/>
-              </a:xfrm>
-              <a:prstGeom prst="line">
-                <a:avLst/>
-              </a:prstGeom>
-            </p:spPr>
-            <p:style>
-              <a:lnRef idx="3">
-                <a:schemeClr val="dk1"/>
-              </a:lnRef>
-              <a:fillRef idx="0">
-                <a:schemeClr val="dk1"/>
-              </a:fillRef>
-              <a:effectRef idx="2">
-                <a:schemeClr val="dk1"/>
-              </a:effectRef>
-              <a:fontRef idx="minor">
-                <a:schemeClr val="tx1"/>
-              </a:fontRef>
-            </p:style>
-          </p:cxnSp>
-          <p:sp>
-            <p:nvSpPr>
-              <p:cNvPr id="117" name="文字方塊 116">
-                <a:extLst>
-                  <a:ext uri="{FF2B5EF4-FFF2-40B4-BE49-F238E27FC236}">
-                    <a16:creationId xmlns:a16="http://schemas.microsoft.com/office/drawing/2014/main" id="{7C144C4C-4C72-4DE7-B249-5A3136AA19E4}"/>
-                  </a:ext>
-                </a:extLst>
-              </p:cNvPr>
-              <p:cNvSpPr txBox="1"/>
-              <p:nvPr/>
-            </p:nvSpPr>
-            <p:spPr>
-              <a:xfrm>
-                <a:off x="1658948" y="1626107"/>
-                <a:ext cx="1176028" cy="276999"/>
-              </a:xfrm>
-              <a:prstGeom prst="rect">
-                <a:avLst/>
-              </a:prstGeom>
-              <a:noFill/>
-            </p:spPr>
-            <p:txBody>
-              <a:bodyPr wrap="none" rtlCol="0">
-                <a:spAutoFit/>
-              </a:bodyPr>
-              <a:lstStyle/>
-              <a:p>
-                <a:r>
-                  <a:rPr lang="en-US" altLang="zh-TW" sz="1200" dirty="0" err="1"/>
-                  <a:t>Num_generator</a:t>
-                </a:r>
-                <a:endParaRPr lang="zh-TW" altLang="en-US" sz="1200" dirty="0"/>
-              </a:p>
-            </p:txBody>
-          </p:sp>
-        </p:grpSp>
-        <p:grpSp>
-          <p:nvGrpSpPr>
-            <p:cNvPr id="69" name="群組 68">
-              <a:extLst>
-                <a:ext uri="{FF2B5EF4-FFF2-40B4-BE49-F238E27FC236}">
-                  <a16:creationId xmlns:a16="http://schemas.microsoft.com/office/drawing/2014/main" id="{E2E8DC39-B7E1-4D20-B1C9-2033009717B6}"/>
-                </a:ext>
-              </a:extLst>
-            </p:cNvPr>
-            <p:cNvGrpSpPr/>
-            <p:nvPr/>
-          </p:nvGrpSpPr>
-          <p:grpSpPr>
-            <a:xfrm>
-              <a:off x="5716722" y="1933526"/>
-              <a:ext cx="1369299" cy="399311"/>
-              <a:chOff x="5741966" y="2610333"/>
-              <a:chExt cx="1369299" cy="399311"/>
-            </a:xfrm>
-          </p:grpSpPr>
-          <p:sp>
-            <p:nvSpPr>
-              <p:cNvPr id="112" name="箭號: 五邊形 111">
-                <a:extLst>
-                  <a:ext uri="{FF2B5EF4-FFF2-40B4-BE49-F238E27FC236}">
-                    <a16:creationId xmlns:a16="http://schemas.microsoft.com/office/drawing/2014/main" id="{E4788EAB-4645-4563-A94F-1F2AED4600F1}"/>
-                  </a:ext>
-                </a:extLst>
-              </p:cNvPr>
-              <p:cNvSpPr/>
-              <p:nvPr/>
-            </p:nvSpPr>
-            <p:spPr>
-              <a:xfrm>
-                <a:off x="5741966" y="2748833"/>
-                <a:ext cx="387927" cy="260811"/>
-              </a:xfrm>
-              <a:prstGeom prst="homePlate">
-                <a:avLst/>
-              </a:prstGeom>
-              <a:solidFill>
-                <a:schemeClr val="accent3">
-                  <a:lumMod val="40000"/>
-                  <a:lumOff val="60000"/>
-                </a:schemeClr>
-              </a:solidFill>
-            </p:spPr>
-            <p:style>
-              <a:lnRef idx="2">
-                <a:schemeClr val="accent1">
-                  <a:shade val="50000"/>
-                </a:schemeClr>
-              </a:lnRef>
-              <a:fillRef idx="1">
-                <a:schemeClr val="accent1"/>
-              </a:fillRef>
-              <a:effectRef idx="0">
-                <a:schemeClr val="accent1"/>
-              </a:effectRef>
-              <a:fontRef idx="minor">
-                <a:schemeClr val="lt1"/>
-              </a:fontRef>
-            </p:style>
-            <p:txBody>
-              <a:bodyPr rtlCol="0" anchor="ctr"/>
-              <a:lstStyle/>
-              <a:p>
-                <a:pPr algn="ctr"/>
-                <a:endParaRPr lang="zh-TW" altLang="en-US"/>
-              </a:p>
-            </p:txBody>
-          </p:sp>
-          <p:cxnSp>
-            <p:nvCxnSpPr>
-              <p:cNvPr id="113" name="直線接點 112">
-                <a:extLst>
-                  <a:ext uri="{FF2B5EF4-FFF2-40B4-BE49-F238E27FC236}">
-                    <a16:creationId xmlns:a16="http://schemas.microsoft.com/office/drawing/2014/main" id="{2FD581DF-4F32-48D5-BA2F-1F91C31612F6}"/>
-                  </a:ext>
-                </a:extLst>
-              </p:cNvPr>
-              <p:cNvCxnSpPr/>
-              <p:nvPr/>
-            </p:nvCxnSpPr>
-            <p:spPr>
-              <a:xfrm flipH="1">
-                <a:off x="6111429" y="2885460"/>
-                <a:ext cx="999836" cy="1"/>
-              </a:xfrm>
-              <a:prstGeom prst="line">
-                <a:avLst/>
-              </a:prstGeom>
-            </p:spPr>
-            <p:style>
-              <a:lnRef idx="3">
-                <a:schemeClr val="dk1"/>
-              </a:lnRef>
-              <a:fillRef idx="0">
-                <a:schemeClr val="dk1"/>
-              </a:fillRef>
-              <a:effectRef idx="2">
-                <a:schemeClr val="dk1"/>
-              </a:effectRef>
-              <a:fontRef idx="minor">
-                <a:schemeClr val="tx1"/>
-              </a:fontRef>
-            </p:style>
-          </p:cxnSp>
-          <p:sp>
-            <p:nvSpPr>
-              <p:cNvPr id="114" name="文字方塊 113">
-                <a:extLst>
-                  <a:ext uri="{FF2B5EF4-FFF2-40B4-BE49-F238E27FC236}">
-                    <a16:creationId xmlns:a16="http://schemas.microsoft.com/office/drawing/2014/main" id="{BA80D4B1-5260-43F0-B9EB-2B7155127B13}"/>
-                  </a:ext>
-                </a:extLst>
-              </p:cNvPr>
-              <p:cNvSpPr txBox="1"/>
-              <p:nvPr/>
-            </p:nvSpPr>
-            <p:spPr>
-              <a:xfrm>
-                <a:off x="6032565" y="2610333"/>
-                <a:ext cx="1025730" cy="276999"/>
-              </a:xfrm>
-              <a:prstGeom prst="rect">
-                <a:avLst/>
-              </a:prstGeom>
-              <a:noFill/>
-            </p:spPr>
-            <p:txBody>
-              <a:bodyPr wrap="none" rtlCol="0">
-                <a:spAutoFit/>
-              </a:bodyPr>
-              <a:lstStyle/>
-              <a:p>
-                <a:r>
-                  <a:rPr lang="en-US" altLang="zh-TW" sz="1200" dirty="0" err="1"/>
-                  <a:t>current_state</a:t>
-                </a:r>
-                <a:endParaRPr lang="zh-TW" altLang="en-US" sz="1200" dirty="0"/>
-              </a:p>
-            </p:txBody>
-          </p:sp>
-        </p:grpSp>
-        <p:grpSp>
-          <p:nvGrpSpPr>
-            <p:cNvPr id="70" name="群組 69">
-              <a:extLst>
-                <a:ext uri="{FF2B5EF4-FFF2-40B4-BE49-F238E27FC236}">
-                  <a16:creationId xmlns:a16="http://schemas.microsoft.com/office/drawing/2014/main" id="{D5F3A046-C41B-4AAF-ADBB-6EDD5437C7D9}"/>
-                </a:ext>
-              </a:extLst>
-            </p:cNvPr>
-            <p:cNvGrpSpPr/>
-            <p:nvPr/>
-          </p:nvGrpSpPr>
-          <p:grpSpPr>
-            <a:xfrm>
-              <a:off x="1359066" y="1725368"/>
-              <a:ext cx="1369299" cy="360072"/>
-              <a:chOff x="1350704" y="1626107"/>
-              <a:chExt cx="1369299" cy="360072"/>
-            </a:xfrm>
-          </p:grpSpPr>
-          <p:sp>
-            <p:nvSpPr>
-              <p:cNvPr id="109" name="箭號: 五邊形 108">
-                <a:extLst>
-                  <a:ext uri="{FF2B5EF4-FFF2-40B4-BE49-F238E27FC236}">
-                    <a16:creationId xmlns:a16="http://schemas.microsoft.com/office/drawing/2014/main" id="{335D8F7B-4183-4EE0-9168-18BD34DA6C58}"/>
-                  </a:ext>
-                </a:extLst>
-              </p:cNvPr>
-              <p:cNvSpPr/>
-              <p:nvPr/>
-            </p:nvSpPr>
-            <p:spPr>
-              <a:xfrm>
-                <a:off x="1350704" y="1725368"/>
-                <a:ext cx="387927" cy="260811"/>
-              </a:xfrm>
-              <a:prstGeom prst="homePlate">
-                <a:avLst/>
-              </a:prstGeom>
-              <a:solidFill>
-                <a:schemeClr val="accent3">
-                  <a:lumMod val="40000"/>
-                  <a:lumOff val="60000"/>
-                </a:schemeClr>
-              </a:solidFill>
-            </p:spPr>
-            <p:style>
-              <a:lnRef idx="2">
-                <a:schemeClr val="accent1">
-                  <a:shade val="50000"/>
-                </a:schemeClr>
-              </a:lnRef>
-              <a:fillRef idx="1">
-                <a:schemeClr val="accent1"/>
-              </a:fillRef>
-              <a:effectRef idx="0">
-                <a:schemeClr val="accent1"/>
-              </a:effectRef>
-              <a:fontRef idx="minor">
-                <a:schemeClr val="lt1"/>
-              </a:fontRef>
-            </p:style>
-            <p:txBody>
-              <a:bodyPr rtlCol="0" anchor="ctr"/>
-              <a:lstStyle/>
-              <a:p>
-                <a:pPr algn="ctr"/>
-                <a:endParaRPr lang="zh-TW" altLang="en-US"/>
-              </a:p>
-            </p:txBody>
-          </p:sp>
-          <p:cxnSp>
-            <p:nvCxnSpPr>
-              <p:cNvPr id="110" name="直線接點 109">
-                <a:extLst>
-                  <a:ext uri="{FF2B5EF4-FFF2-40B4-BE49-F238E27FC236}">
-                    <a16:creationId xmlns:a16="http://schemas.microsoft.com/office/drawing/2014/main" id="{92CCABEA-6AA3-4366-A61A-B4B04518ED86}"/>
-                  </a:ext>
-                </a:extLst>
-              </p:cNvPr>
-              <p:cNvCxnSpPr/>
-              <p:nvPr/>
-            </p:nvCxnSpPr>
-            <p:spPr>
-              <a:xfrm flipH="1">
-                <a:off x="1720167" y="1861995"/>
-                <a:ext cx="999836" cy="1"/>
-              </a:xfrm>
-              <a:prstGeom prst="line">
-                <a:avLst/>
-              </a:prstGeom>
-            </p:spPr>
-            <p:style>
-              <a:lnRef idx="3">
-                <a:schemeClr val="dk1"/>
-              </a:lnRef>
-              <a:fillRef idx="0">
-                <a:schemeClr val="dk1"/>
-              </a:fillRef>
-              <a:effectRef idx="2">
-                <a:schemeClr val="dk1"/>
-              </a:effectRef>
-              <a:fontRef idx="minor">
-                <a:schemeClr val="tx1"/>
-              </a:fontRef>
-            </p:style>
-          </p:cxnSp>
-          <p:sp>
-            <p:nvSpPr>
-              <p:cNvPr id="111" name="文字方塊 110">
-                <a:extLst>
-                  <a:ext uri="{FF2B5EF4-FFF2-40B4-BE49-F238E27FC236}">
-                    <a16:creationId xmlns:a16="http://schemas.microsoft.com/office/drawing/2014/main" id="{7349C508-722C-48E6-BE00-97AF808D2A71}"/>
-                  </a:ext>
-                </a:extLst>
-              </p:cNvPr>
-              <p:cNvSpPr txBox="1"/>
-              <p:nvPr/>
-            </p:nvSpPr>
-            <p:spPr>
-              <a:xfrm>
-                <a:off x="1658948" y="1626107"/>
-                <a:ext cx="995914" cy="276999"/>
-              </a:xfrm>
-              <a:prstGeom prst="rect">
-                <a:avLst/>
-              </a:prstGeom>
-              <a:noFill/>
-            </p:spPr>
-            <p:txBody>
-              <a:bodyPr wrap="none" rtlCol="0">
-                <a:spAutoFit/>
-              </a:bodyPr>
-              <a:lstStyle/>
-              <a:p>
-                <a:r>
-                  <a:rPr lang="en-US" altLang="zh-TW" sz="1200" dirty="0" err="1"/>
-                  <a:t>Pop_rf_done</a:t>
-                </a:r>
-                <a:endParaRPr lang="zh-TW" altLang="en-US" sz="1200" dirty="0"/>
-              </a:p>
-            </p:txBody>
-          </p:sp>
-        </p:grpSp>
-        <p:grpSp>
-          <p:nvGrpSpPr>
-            <p:cNvPr id="71" name="群組 70">
-              <a:extLst>
-                <a:ext uri="{FF2B5EF4-FFF2-40B4-BE49-F238E27FC236}">
-                  <a16:creationId xmlns:a16="http://schemas.microsoft.com/office/drawing/2014/main" id="{B29DBC1F-E453-4A9E-BE6A-61F8A2D0D324}"/>
-                </a:ext>
-              </a:extLst>
-            </p:cNvPr>
-            <p:cNvGrpSpPr/>
-            <p:nvPr/>
-          </p:nvGrpSpPr>
-          <p:grpSpPr>
-            <a:xfrm>
-              <a:off x="1360079" y="2071988"/>
-              <a:ext cx="1369299" cy="360072"/>
-              <a:chOff x="1350704" y="1626107"/>
-              <a:chExt cx="1369299" cy="360072"/>
-            </a:xfrm>
-          </p:grpSpPr>
-          <p:sp>
-            <p:nvSpPr>
-              <p:cNvPr id="106" name="箭號: 五邊形 105">
-                <a:extLst>
-                  <a:ext uri="{FF2B5EF4-FFF2-40B4-BE49-F238E27FC236}">
-                    <a16:creationId xmlns:a16="http://schemas.microsoft.com/office/drawing/2014/main" id="{C054D239-E822-46EA-BE9E-16EA9E9FF8FA}"/>
-                  </a:ext>
-                </a:extLst>
-              </p:cNvPr>
-              <p:cNvSpPr/>
-              <p:nvPr/>
-            </p:nvSpPr>
-            <p:spPr>
-              <a:xfrm>
-                <a:off x="1350704" y="1725368"/>
-                <a:ext cx="387927" cy="260811"/>
-              </a:xfrm>
-              <a:prstGeom prst="homePlate">
-                <a:avLst/>
-              </a:prstGeom>
-              <a:solidFill>
-                <a:schemeClr val="accent3">
-                  <a:lumMod val="40000"/>
-                  <a:lumOff val="60000"/>
-                </a:schemeClr>
-              </a:solidFill>
-            </p:spPr>
-            <p:style>
-              <a:lnRef idx="2">
-                <a:schemeClr val="accent1">
-                  <a:shade val="50000"/>
-                </a:schemeClr>
-              </a:lnRef>
-              <a:fillRef idx="1">
-                <a:schemeClr val="accent1"/>
-              </a:fillRef>
-              <a:effectRef idx="0">
-                <a:schemeClr val="accent1"/>
-              </a:effectRef>
-              <a:fontRef idx="minor">
-                <a:schemeClr val="lt1"/>
-              </a:fontRef>
-            </p:style>
-            <p:txBody>
-              <a:bodyPr rtlCol="0" anchor="ctr"/>
-              <a:lstStyle/>
-              <a:p>
-                <a:pPr algn="ctr"/>
-                <a:endParaRPr lang="zh-TW" altLang="en-US"/>
-              </a:p>
-            </p:txBody>
-          </p:sp>
-          <p:cxnSp>
-            <p:nvCxnSpPr>
-              <p:cNvPr id="107" name="直線接點 106">
-                <a:extLst>
-                  <a:ext uri="{FF2B5EF4-FFF2-40B4-BE49-F238E27FC236}">
-                    <a16:creationId xmlns:a16="http://schemas.microsoft.com/office/drawing/2014/main" id="{77C3B568-EAD7-4C8D-8B42-606A145D8BBC}"/>
-                  </a:ext>
-                </a:extLst>
-              </p:cNvPr>
-              <p:cNvCxnSpPr/>
-              <p:nvPr/>
-            </p:nvCxnSpPr>
-            <p:spPr>
-              <a:xfrm flipH="1">
-                <a:off x="1720167" y="1861995"/>
-                <a:ext cx="999836" cy="1"/>
-              </a:xfrm>
-              <a:prstGeom prst="line">
-                <a:avLst/>
-              </a:prstGeom>
-            </p:spPr>
-            <p:style>
-              <a:lnRef idx="3">
-                <a:schemeClr val="dk1"/>
-              </a:lnRef>
-              <a:fillRef idx="0">
-                <a:schemeClr val="dk1"/>
-              </a:fillRef>
-              <a:effectRef idx="2">
-                <a:schemeClr val="dk1"/>
-              </a:effectRef>
-              <a:fontRef idx="minor">
-                <a:schemeClr val="tx1"/>
-              </a:fontRef>
-            </p:style>
-          </p:cxnSp>
-          <p:sp>
-            <p:nvSpPr>
-              <p:cNvPr id="108" name="文字方塊 107">
-                <a:extLst>
-                  <a:ext uri="{FF2B5EF4-FFF2-40B4-BE49-F238E27FC236}">
-                    <a16:creationId xmlns:a16="http://schemas.microsoft.com/office/drawing/2014/main" id="{57CB796F-6369-483D-8387-29ADA5940056}"/>
-                  </a:ext>
-                </a:extLst>
-              </p:cNvPr>
-              <p:cNvSpPr txBox="1"/>
-              <p:nvPr/>
-            </p:nvSpPr>
-            <p:spPr>
-              <a:xfrm>
-                <a:off x="1658948" y="1626107"/>
-                <a:ext cx="814647" cy="276999"/>
-              </a:xfrm>
-              <a:prstGeom prst="rect">
-                <a:avLst/>
-              </a:prstGeom>
-              <a:noFill/>
-            </p:spPr>
-            <p:txBody>
-              <a:bodyPr wrap="none" rtlCol="0">
-                <a:spAutoFit/>
-              </a:bodyPr>
-              <a:lstStyle/>
-              <a:p>
-                <a:r>
-                  <a:rPr lang="en-US" altLang="zh-TW" sz="1200" dirty="0" err="1"/>
-                  <a:t>Out_done</a:t>
-                </a:r>
-                <a:endParaRPr lang="zh-TW" altLang="en-US" sz="1200" dirty="0"/>
-              </a:p>
-            </p:txBody>
-          </p:sp>
-        </p:grpSp>
-        <p:grpSp>
-          <p:nvGrpSpPr>
-            <p:cNvPr id="72" name="群組 71">
-              <a:extLst>
-                <a:ext uri="{FF2B5EF4-FFF2-40B4-BE49-F238E27FC236}">
-                  <a16:creationId xmlns:a16="http://schemas.microsoft.com/office/drawing/2014/main" id="{0FDC9567-D26D-438B-8139-4D6EF828A561}"/>
-                </a:ext>
-              </a:extLst>
-            </p:cNvPr>
-            <p:cNvGrpSpPr/>
-            <p:nvPr/>
-          </p:nvGrpSpPr>
-          <p:grpSpPr>
-            <a:xfrm>
-              <a:off x="1357190" y="2421602"/>
-              <a:ext cx="1369299" cy="360072"/>
-              <a:chOff x="1350704" y="1626107"/>
-              <a:chExt cx="1369299" cy="360072"/>
-            </a:xfrm>
-          </p:grpSpPr>
-          <p:sp>
-            <p:nvSpPr>
-              <p:cNvPr id="103" name="箭號: 五邊形 102">
-                <a:extLst>
-                  <a:ext uri="{FF2B5EF4-FFF2-40B4-BE49-F238E27FC236}">
-                    <a16:creationId xmlns:a16="http://schemas.microsoft.com/office/drawing/2014/main" id="{26A72043-5E07-4D42-8AA1-8BE3688B1620}"/>
-                  </a:ext>
-                </a:extLst>
-              </p:cNvPr>
-              <p:cNvSpPr/>
-              <p:nvPr/>
-            </p:nvSpPr>
-            <p:spPr>
-              <a:xfrm>
-                <a:off x="1350704" y="1725368"/>
-                <a:ext cx="387927" cy="260811"/>
-              </a:xfrm>
-              <a:prstGeom prst="homePlate">
-                <a:avLst/>
-              </a:prstGeom>
-              <a:solidFill>
-                <a:schemeClr val="accent3">
-                  <a:lumMod val="40000"/>
-                  <a:lumOff val="60000"/>
-                </a:schemeClr>
-              </a:solidFill>
-            </p:spPr>
-            <p:style>
-              <a:lnRef idx="2">
-                <a:schemeClr val="accent1">
-                  <a:shade val="50000"/>
-                </a:schemeClr>
-              </a:lnRef>
-              <a:fillRef idx="1">
-                <a:schemeClr val="accent1"/>
-              </a:fillRef>
-              <a:effectRef idx="0">
-                <a:schemeClr val="accent1"/>
-              </a:effectRef>
-              <a:fontRef idx="minor">
-                <a:schemeClr val="lt1"/>
-              </a:fontRef>
-            </p:style>
-            <p:txBody>
-              <a:bodyPr rtlCol="0" anchor="ctr"/>
-              <a:lstStyle/>
-              <a:p>
-                <a:pPr algn="ctr"/>
-                <a:endParaRPr lang="zh-TW" altLang="en-US" dirty="0"/>
-              </a:p>
-            </p:txBody>
-          </p:sp>
-          <p:cxnSp>
-            <p:nvCxnSpPr>
-              <p:cNvPr id="104" name="直線接點 103">
-                <a:extLst>
-                  <a:ext uri="{FF2B5EF4-FFF2-40B4-BE49-F238E27FC236}">
-                    <a16:creationId xmlns:a16="http://schemas.microsoft.com/office/drawing/2014/main" id="{D61C7585-541F-4F8D-B190-2C908C373C9B}"/>
-                  </a:ext>
-                </a:extLst>
-              </p:cNvPr>
-              <p:cNvCxnSpPr/>
-              <p:nvPr/>
-            </p:nvCxnSpPr>
-            <p:spPr>
-              <a:xfrm flipH="1">
-                <a:off x="1720167" y="1861995"/>
-                <a:ext cx="999836" cy="1"/>
-              </a:xfrm>
-              <a:prstGeom prst="line">
-                <a:avLst/>
-              </a:prstGeom>
-            </p:spPr>
-            <p:style>
-              <a:lnRef idx="3">
-                <a:schemeClr val="dk1"/>
-              </a:lnRef>
-              <a:fillRef idx="0">
-                <a:schemeClr val="dk1"/>
-              </a:fillRef>
-              <a:effectRef idx="2">
-                <a:schemeClr val="dk1"/>
-              </a:effectRef>
-              <a:fontRef idx="minor">
-                <a:schemeClr val="tx1"/>
-              </a:fontRef>
-            </p:style>
-          </p:cxnSp>
-          <p:sp>
-            <p:nvSpPr>
-              <p:cNvPr id="105" name="文字方塊 104">
-                <a:extLst>
-                  <a:ext uri="{FF2B5EF4-FFF2-40B4-BE49-F238E27FC236}">
-                    <a16:creationId xmlns:a16="http://schemas.microsoft.com/office/drawing/2014/main" id="{C05A79F5-BD16-4EA8-BB6D-6A774B28A4E8}"/>
-                  </a:ext>
-                </a:extLst>
-              </p:cNvPr>
-              <p:cNvSpPr txBox="1"/>
-              <p:nvPr/>
-            </p:nvSpPr>
-            <p:spPr>
-              <a:xfrm>
-                <a:off x="1658948" y="1626107"/>
-                <a:ext cx="671338" cy="276999"/>
-              </a:xfrm>
-              <a:prstGeom prst="rect">
-                <a:avLst/>
-              </a:prstGeom>
-              <a:noFill/>
-            </p:spPr>
-            <p:txBody>
-              <a:bodyPr wrap="none" rtlCol="0">
-                <a:spAutoFit/>
-              </a:bodyPr>
-              <a:lstStyle/>
-              <a:p>
-                <a:r>
-                  <a:rPr lang="en-US" altLang="zh-TW" sz="1200" dirty="0" err="1"/>
-                  <a:t>In_valid</a:t>
-                </a:r>
-                <a:endParaRPr lang="en-US" altLang="zh-TW" sz="1200" dirty="0"/>
-              </a:p>
-            </p:txBody>
-          </p:sp>
-        </p:grpSp>
-        <p:grpSp>
-          <p:nvGrpSpPr>
-            <p:cNvPr id="73" name="群組 72">
-              <a:extLst>
-                <a:ext uri="{FF2B5EF4-FFF2-40B4-BE49-F238E27FC236}">
-                  <a16:creationId xmlns:a16="http://schemas.microsoft.com/office/drawing/2014/main" id="{09FF5A4B-9598-4379-ACF8-3F1A3EC339B4}"/>
-                </a:ext>
-              </a:extLst>
-            </p:cNvPr>
-            <p:cNvGrpSpPr/>
-            <p:nvPr/>
-          </p:nvGrpSpPr>
-          <p:grpSpPr>
-            <a:xfrm>
-              <a:off x="1362469" y="2885219"/>
-              <a:ext cx="1369299" cy="260811"/>
-              <a:chOff x="1350704" y="1725368"/>
-              <a:chExt cx="1369299" cy="260811"/>
-            </a:xfrm>
-          </p:grpSpPr>
-          <p:sp>
-            <p:nvSpPr>
-              <p:cNvPr id="100" name="箭號: 五邊形 99">
-                <a:extLst>
-                  <a:ext uri="{FF2B5EF4-FFF2-40B4-BE49-F238E27FC236}">
-                    <a16:creationId xmlns:a16="http://schemas.microsoft.com/office/drawing/2014/main" id="{7886C535-A1BB-43EE-9026-1A689A9D7F85}"/>
-                  </a:ext>
-                </a:extLst>
-              </p:cNvPr>
-              <p:cNvSpPr/>
-              <p:nvPr/>
-            </p:nvSpPr>
-            <p:spPr>
-              <a:xfrm>
-                <a:off x="1350704" y="1725368"/>
-                <a:ext cx="387927" cy="260811"/>
-              </a:xfrm>
-              <a:prstGeom prst="homePlate">
-                <a:avLst/>
-              </a:prstGeom>
-              <a:solidFill>
-                <a:schemeClr val="accent3">
-                  <a:lumMod val="40000"/>
-                  <a:lumOff val="60000"/>
-                </a:schemeClr>
-              </a:solidFill>
-            </p:spPr>
-            <p:style>
-              <a:lnRef idx="2">
-                <a:schemeClr val="accent1">
-                  <a:shade val="50000"/>
-                </a:schemeClr>
-              </a:lnRef>
-              <a:fillRef idx="1">
-                <a:schemeClr val="accent1"/>
-              </a:fillRef>
-              <a:effectRef idx="0">
-                <a:schemeClr val="accent1"/>
-              </a:effectRef>
-              <a:fontRef idx="minor">
-                <a:schemeClr val="lt1"/>
-              </a:fontRef>
-            </p:style>
-            <p:txBody>
-              <a:bodyPr rtlCol="0" anchor="ctr"/>
-              <a:lstStyle/>
-              <a:p>
-                <a:pPr algn="ctr"/>
-                <a:endParaRPr lang="zh-TW" altLang="en-US" dirty="0"/>
-              </a:p>
-            </p:txBody>
-          </p:sp>
-          <p:cxnSp>
-            <p:nvCxnSpPr>
-              <p:cNvPr id="101" name="直線接點 100">
-                <a:extLst>
-                  <a:ext uri="{FF2B5EF4-FFF2-40B4-BE49-F238E27FC236}">
-                    <a16:creationId xmlns:a16="http://schemas.microsoft.com/office/drawing/2014/main" id="{7BF1E965-2654-48C7-AB6A-1C71D8BBD70C}"/>
-                  </a:ext>
-                </a:extLst>
-              </p:cNvPr>
-              <p:cNvCxnSpPr/>
-              <p:nvPr/>
-            </p:nvCxnSpPr>
-            <p:spPr>
-              <a:xfrm flipH="1">
-                <a:off x="1720167" y="1861995"/>
-                <a:ext cx="999836" cy="1"/>
-              </a:xfrm>
-              <a:prstGeom prst="line">
-                <a:avLst/>
-              </a:prstGeom>
-            </p:spPr>
-            <p:style>
-              <a:lnRef idx="3">
-                <a:schemeClr val="dk1"/>
-              </a:lnRef>
-              <a:fillRef idx="0">
-                <a:schemeClr val="dk1"/>
-              </a:fillRef>
-              <a:effectRef idx="2">
-                <a:schemeClr val="dk1"/>
-              </a:effectRef>
-              <a:fontRef idx="minor">
-                <a:schemeClr val="tx1"/>
-              </a:fontRef>
-            </p:style>
-          </p:cxnSp>
-        </p:grpSp>
-        <p:grpSp>
-          <p:nvGrpSpPr>
-            <p:cNvPr id="74" name="群組 73">
-              <a:extLst>
-                <a:ext uri="{FF2B5EF4-FFF2-40B4-BE49-F238E27FC236}">
-                  <a16:creationId xmlns:a16="http://schemas.microsoft.com/office/drawing/2014/main" id="{F7A34B9D-592B-4436-97AE-BA18309DD22C}"/>
-                </a:ext>
-              </a:extLst>
-            </p:cNvPr>
-            <p:cNvGrpSpPr/>
-            <p:nvPr/>
-          </p:nvGrpSpPr>
-          <p:grpSpPr>
-            <a:xfrm>
-              <a:off x="1372260" y="3261479"/>
-              <a:ext cx="1369299" cy="260811"/>
-              <a:chOff x="1350704" y="1725368"/>
-              <a:chExt cx="1369299" cy="260811"/>
-            </a:xfrm>
-          </p:grpSpPr>
-          <p:sp>
-            <p:nvSpPr>
-              <p:cNvPr id="97" name="箭號: 五邊形 96">
-                <a:extLst>
-                  <a:ext uri="{FF2B5EF4-FFF2-40B4-BE49-F238E27FC236}">
-                    <a16:creationId xmlns:a16="http://schemas.microsoft.com/office/drawing/2014/main" id="{3765D90B-1ED6-4ABE-BDC8-C1DA30F03E56}"/>
-                  </a:ext>
-                </a:extLst>
-              </p:cNvPr>
-              <p:cNvSpPr/>
-              <p:nvPr/>
-            </p:nvSpPr>
-            <p:spPr>
-              <a:xfrm>
-                <a:off x="1350704" y="1725368"/>
-                <a:ext cx="387927" cy="260811"/>
-              </a:xfrm>
-              <a:prstGeom prst="homePlate">
-                <a:avLst/>
-              </a:prstGeom>
-              <a:solidFill>
-                <a:schemeClr val="accent3">
-                  <a:lumMod val="40000"/>
-                  <a:lumOff val="60000"/>
-                </a:schemeClr>
-              </a:solidFill>
-            </p:spPr>
-            <p:style>
-              <a:lnRef idx="2">
-                <a:schemeClr val="accent1">
-                  <a:shade val="50000"/>
-                </a:schemeClr>
-              </a:lnRef>
-              <a:fillRef idx="1">
-                <a:schemeClr val="accent1"/>
-              </a:fillRef>
-              <a:effectRef idx="0">
-                <a:schemeClr val="accent1"/>
-              </a:effectRef>
-              <a:fontRef idx="minor">
-                <a:schemeClr val="lt1"/>
-              </a:fontRef>
-            </p:style>
-            <p:txBody>
-              <a:bodyPr rtlCol="0" anchor="ctr"/>
-              <a:lstStyle/>
-              <a:p>
-                <a:pPr algn="ctr"/>
-                <a:endParaRPr lang="zh-TW" altLang="en-US" dirty="0"/>
-              </a:p>
-            </p:txBody>
-          </p:sp>
-          <p:cxnSp>
-            <p:nvCxnSpPr>
-              <p:cNvPr id="98" name="直線接點 97">
-                <a:extLst>
-                  <a:ext uri="{FF2B5EF4-FFF2-40B4-BE49-F238E27FC236}">
-                    <a16:creationId xmlns:a16="http://schemas.microsoft.com/office/drawing/2014/main" id="{AF45124C-B558-4FDF-A9C5-032FA39A9FE4}"/>
-                  </a:ext>
-                </a:extLst>
-              </p:cNvPr>
-              <p:cNvCxnSpPr/>
-              <p:nvPr/>
-            </p:nvCxnSpPr>
-            <p:spPr>
-              <a:xfrm flipH="1">
-                <a:off x="1720167" y="1861995"/>
-                <a:ext cx="999836" cy="1"/>
-              </a:xfrm>
-              <a:prstGeom prst="line">
-                <a:avLst/>
-              </a:prstGeom>
-            </p:spPr>
-            <p:style>
-              <a:lnRef idx="3">
-                <a:schemeClr val="dk1"/>
-              </a:lnRef>
-              <a:fillRef idx="0">
-                <a:schemeClr val="dk1"/>
-              </a:fillRef>
-              <a:effectRef idx="2">
-                <a:schemeClr val="dk1"/>
-              </a:effectRef>
-              <a:fontRef idx="minor">
-                <a:schemeClr val="tx1"/>
-              </a:fontRef>
-            </p:style>
-          </p:cxnSp>
-        </p:grpSp>
-        <p:grpSp>
-          <p:nvGrpSpPr>
-            <p:cNvPr id="75" name="群組 74">
-              <a:extLst>
-                <a:ext uri="{FF2B5EF4-FFF2-40B4-BE49-F238E27FC236}">
-                  <a16:creationId xmlns:a16="http://schemas.microsoft.com/office/drawing/2014/main" id="{FFAE6323-D779-47DA-BF99-117679DADE18}"/>
-                </a:ext>
-              </a:extLst>
-            </p:cNvPr>
-            <p:cNvGrpSpPr/>
-            <p:nvPr/>
-          </p:nvGrpSpPr>
-          <p:grpSpPr>
-            <a:xfrm>
-              <a:off x="1372260" y="3625835"/>
-              <a:ext cx="1369299" cy="260811"/>
-              <a:chOff x="1350704" y="1725368"/>
-              <a:chExt cx="1369299" cy="260811"/>
-            </a:xfrm>
-          </p:grpSpPr>
-          <p:sp>
-            <p:nvSpPr>
-              <p:cNvPr id="94" name="箭號: 五邊形 93">
-                <a:extLst>
-                  <a:ext uri="{FF2B5EF4-FFF2-40B4-BE49-F238E27FC236}">
-                    <a16:creationId xmlns:a16="http://schemas.microsoft.com/office/drawing/2014/main" id="{EB71D558-1F18-4B6B-B249-EB64E6C0E62F}"/>
-                  </a:ext>
-                </a:extLst>
-              </p:cNvPr>
-              <p:cNvSpPr/>
-              <p:nvPr/>
-            </p:nvSpPr>
-            <p:spPr>
-              <a:xfrm>
-                <a:off x="1350704" y="1725368"/>
-                <a:ext cx="387927" cy="260811"/>
-              </a:xfrm>
-              <a:prstGeom prst="homePlate">
-                <a:avLst/>
-              </a:prstGeom>
-              <a:solidFill>
-                <a:schemeClr val="accent3">
-                  <a:lumMod val="40000"/>
-                  <a:lumOff val="60000"/>
-                </a:schemeClr>
-              </a:solidFill>
-            </p:spPr>
-            <p:style>
-              <a:lnRef idx="2">
-                <a:schemeClr val="accent1">
-                  <a:shade val="50000"/>
-                </a:schemeClr>
-              </a:lnRef>
-              <a:fillRef idx="1">
-                <a:schemeClr val="accent1"/>
-              </a:fillRef>
-              <a:effectRef idx="0">
-                <a:schemeClr val="accent1"/>
-              </a:effectRef>
-              <a:fontRef idx="minor">
-                <a:schemeClr val="lt1"/>
-              </a:fontRef>
-            </p:style>
-            <p:txBody>
-              <a:bodyPr rtlCol="0" anchor="ctr"/>
-              <a:lstStyle/>
-              <a:p>
-                <a:pPr algn="ctr"/>
-                <a:endParaRPr lang="zh-TW" altLang="en-US" dirty="0"/>
-              </a:p>
-            </p:txBody>
-          </p:sp>
-          <p:cxnSp>
-            <p:nvCxnSpPr>
-              <p:cNvPr id="95" name="直線接點 94">
-                <a:extLst>
-                  <a:ext uri="{FF2B5EF4-FFF2-40B4-BE49-F238E27FC236}">
-                    <a16:creationId xmlns:a16="http://schemas.microsoft.com/office/drawing/2014/main" id="{1ED67142-C98E-407A-8084-226E2ADE0D32}"/>
-                  </a:ext>
-                </a:extLst>
-              </p:cNvPr>
-              <p:cNvCxnSpPr/>
-              <p:nvPr/>
-            </p:nvCxnSpPr>
-            <p:spPr>
-              <a:xfrm flipH="1">
-                <a:off x="1720167" y="1861995"/>
-                <a:ext cx="999836" cy="1"/>
-              </a:xfrm>
-              <a:prstGeom prst="line">
-                <a:avLst/>
-              </a:prstGeom>
-            </p:spPr>
-            <p:style>
-              <a:lnRef idx="3">
-                <a:schemeClr val="dk1"/>
-              </a:lnRef>
-              <a:fillRef idx="0">
-                <a:schemeClr val="dk1"/>
-              </a:fillRef>
-              <a:effectRef idx="2">
-                <a:schemeClr val="dk1"/>
-              </a:effectRef>
-              <a:fontRef idx="minor">
-                <a:schemeClr val="tx1"/>
-              </a:fontRef>
-            </p:style>
-          </p:cxnSp>
-        </p:grpSp>
-        <p:grpSp>
-          <p:nvGrpSpPr>
-            <p:cNvPr id="76" name="群組 75">
-              <a:extLst>
-                <a:ext uri="{FF2B5EF4-FFF2-40B4-BE49-F238E27FC236}">
-                  <a16:creationId xmlns:a16="http://schemas.microsoft.com/office/drawing/2014/main" id="{409E1A21-6C2F-44DB-A99E-C4744F747A6D}"/>
-                </a:ext>
-              </a:extLst>
-            </p:cNvPr>
-            <p:cNvGrpSpPr/>
-            <p:nvPr/>
-          </p:nvGrpSpPr>
-          <p:grpSpPr>
-            <a:xfrm>
-              <a:off x="1380983" y="3990191"/>
-              <a:ext cx="1369299" cy="260811"/>
-              <a:chOff x="1350704" y="1725368"/>
-              <a:chExt cx="1369299" cy="260811"/>
-            </a:xfrm>
-          </p:grpSpPr>
-          <p:sp>
-            <p:nvSpPr>
-              <p:cNvPr id="91" name="箭號: 五邊形 90">
-                <a:extLst>
-                  <a:ext uri="{FF2B5EF4-FFF2-40B4-BE49-F238E27FC236}">
-                    <a16:creationId xmlns:a16="http://schemas.microsoft.com/office/drawing/2014/main" id="{9331CFB3-DD8E-405F-AD2A-25A94E895B83}"/>
-                  </a:ext>
-                </a:extLst>
-              </p:cNvPr>
-              <p:cNvSpPr/>
-              <p:nvPr/>
-            </p:nvSpPr>
-            <p:spPr>
-              <a:xfrm>
-                <a:off x="1350704" y="1725368"/>
-                <a:ext cx="387927" cy="260811"/>
-              </a:xfrm>
-              <a:prstGeom prst="homePlate">
-                <a:avLst/>
-              </a:prstGeom>
-              <a:solidFill>
-                <a:schemeClr val="accent3">
-                  <a:lumMod val="40000"/>
-                  <a:lumOff val="60000"/>
-                </a:schemeClr>
-              </a:solidFill>
-            </p:spPr>
-            <p:style>
-              <a:lnRef idx="2">
-                <a:schemeClr val="accent1">
-                  <a:shade val="50000"/>
-                </a:schemeClr>
-              </a:lnRef>
-              <a:fillRef idx="1">
-                <a:schemeClr val="accent1"/>
-              </a:fillRef>
-              <a:effectRef idx="0">
-                <a:schemeClr val="accent1"/>
-              </a:effectRef>
-              <a:fontRef idx="minor">
-                <a:schemeClr val="lt1"/>
-              </a:fontRef>
-            </p:style>
-            <p:txBody>
-              <a:bodyPr rtlCol="0" anchor="ctr"/>
-              <a:lstStyle/>
-              <a:p>
-                <a:pPr algn="ctr"/>
-                <a:endParaRPr lang="zh-TW" altLang="en-US" dirty="0"/>
-              </a:p>
-            </p:txBody>
-          </p:sp>
-          <p:cxnSp>
-            <p:nvCxnSpPr>
-              <p:cNvPr id="92" name="直線接點 91">
-                <a:extLst>
-                  <a:ext uri="{FF2B5EF4-FFF2-40B4-BE49-F238E27FC236}">
-                    <a16:creationId xmlns:a16="http://schemas.microsoft.com/office/drawing/2014/main" id="{9D23F754-A094-49E2-8173-2B9D4AE7BBB7}"/>
-                  </a:ext>
-                </a:extLst>
-              </p:cNvPr>
-              <p:cNvCxnSpPr/>
-              <p:nvPr/>
-            </p:nvCxnSpPr>
-            <p:spPr>
-              <a:xfrm flipH="1">
-                <a:off x="1720167" y="1861995"/>
-                <a:ext cx="999836" cy="1"/>
-              </a:xfrm>
-              <a:prstGeom prst="line">
-                <a:avLst/>
-              </a:prstGeom>
-            </p:spPr>
-            <p:style>
-              <a:lnRef idx="3">
-                <a:schemeClr val="dk1"/>
-              </a:lnRef>
-              <a:fillRef idx="0">
-                <a:schemeClr val="dk1"/>
-              </a:fillRef>
-              <a:effectRef idx="2">
-                <a:schemeClr val="dk1"/>
-              </a:effectRef>
-              <a:fontRef idx="minor">
-                <a:schemeClr val="tx1"/>
-              </a:fontRef>
-            </p:style>
-          </p:cxnSp>
-        </p:grpSp>
-        <p:grpSp>
-          <p:nvGrpSpPr>
-            <p:cNvPr id="77" name="群組 76">
-              <a:extLst>
-                <a:ext uri="{FF2B5EF4-FFF2-40B4-BE49-F238E27FC236}">
-                  <a16:creationId xmlns:a16="http://schemas.microsoft.com/office/drawing/2014/main" id="{A02293E0-8651-46DB-995D-7438B7989060}"/>
-                </a:ext>
-              </a:extLst>
-            </p:cNvPr>
-            <p:cNvGrpSpPr/>
-            <p:nvPr/>
-          </p:nvGrpSpPr>
-          <p:grpSpPr>
-            <a:xfrm>
-              <a:off x="1377547" y="4350262"/>
-              <a:ext cx="1369299" cy="260811"/>
-              <a:chOff x="1350704" y="1725368"/>
-              <a:chExt cx="1369299" cy="260811"/>
-            </a:xfrm>
-          </p:grpSpPr>
-          <p:sp>
-            <p:nvSpPr>
-              <p:cNvPr id="88" name="箭號: 五邊形 87">
-                <a:extLst>
-                  <a:ext uri="{FF2B5EF4-FFF2-40B4-BE49-F238E27FC236}">
-                    <a16:creationId xmlns:a16="http://schemas.microsoft.com/office/drawing/2014/main" id="{14A1F48D-F029-4831-B465-ED409EE5F792}"/>
-                  </a:ext>
-                </a:extLst>
-              </p:cNvPr>
-              <p:cNvSpPr/>
-              <p:nvPr/>
-            </p:nvSpPr>
-            <p:spPr>
-              <a:xfrm>
-                <a:off x="1350704" y="1725368"/>
-                <a:ext cx="387927" cy="260811"/>
-              </a:xfrm>
-              <a:prstGeom prst="homePlate">
-                <a:avLst/>
-              </a:prstGeom>
-              <a:solidFill>
-                <a:schemeClr val="accent3">
-                  <a:lumMod val="40000"/>
-                  <a:lumOff val="60000"/>
-                </a:schemeClr>
-              </a:solidFill>
-            </p:spPr>
-            <p:style>
-              <a:lnRef idx="2">
-                <a:schemeClr val="accent1">
-                  <a:shade val="50000"/>
-                </a:schemeClr>
-              </a:lnRef>
-              <a:fillRef idx="1">
-                <a:schemeClr val="accent1"/>
-              </a:fillRef>
-              <a:effectRef idx="0">
-                <a:schemeClr val="accent1"/>
-              </a:effectRef>
-              <a:fontRef idx="minor">
-                <a:schemeClr val="lt1"/>
-              </a:fontRef>
-            </p:style>
-            <p:txBody>
-              <a:bodyPr rtlCol="0" anchor="ctr"/>
-              <a:lstStyle/>
-              <a:p>
-                <a:pPr algn="ctr"/>
-                <a:endParaRPr lang="zh-TW" altLang="en-US"/>
-              </a:p>
-            </p:txBody>
-          </p:sp>
-          <p:cxnSp>
-            <p:nvCxnSpPr>
-              <p:cNvPr id="89" name="直線接點 88">
-                <a:extLst>
-                  <a:ext uri="{FF2B5EF4-FFF2-40B4-BE49-F238E27FC236}">
-                    <a16:creationId xmlns:a16="http://schemas.microsoft.com/office/drawing/2014/main" id="{6132E117-8DFE-4BB6-8785-62FDBB7B3711}"/>
-                  </a:ext>
-                </a:extLst>
-              </p:cNvPr>
-              <p:cNvCxnSpPr/>
-              <p:nvPr/>
-            </p:nvCxnSpPr>
-            <p:spPr>
-              <a:xfrm flipH="1">
-                <a:off x="1720167" y="1861995"/>
-                <a:ext cx="999836" cy="1"/>
-              </a:xfrm>
-              <a:prstGeom prst="line">
-                <a:avLst/>
-              </a:prstGeom>
-            </p:spPr>
-            <p:style>
-              <a:lnRef idx="3">
-                <a:schemeClr val="dk1"/>
-              </a:lnRef>
-              <a:fillRef idx="0">
-                <a:schemeClr val="dk1"/>
-              </a:fillRef>
-              <a:effectRef idx="2">
-                <a:schemeClr val="dk1"/>
-              </a:effectRef>
-              <a:fontRef idx="minor">
-                <a:schemeClr val="tx1"/>
-              </a:fontRef>
-            </p:style>
-          </p:cxnSp>
-        </p:grpSp>
-        <p:grpSp>
-          <p:nvGrpSpPr>
-            <p:cNvPr id="78" name="群組 77">
-              <a:extLst>
-                <a:ext uri="{FF2B5EF4-FFF2-40B4-BE49-F238E27FC236}">
-                  <a16:creationId xmlns:a16="http://schemas.microsoft.com/office/drawing/2014/main" id="{8BE9774B-AD24-4C55-8269-EFE343252C46}"/>
-                </a:ext>
-              </a:extLst>
-            </p:cNvPr>
-            <p:cNvGrpSpPr/>
-            <p:nvPr/>
-          </p:nvGrpSpPr>
-          <p:grpSpPr>
-            <a:xfrm>
-              <a:off x="1380983" y="4688585"/>
-              <a:ext cx="1369299" cy="260811"/>
-              <a:chOff x="1350704" y="1725368"/>
-              <a:chExt cx="1369299" cy="260811"/>
-            </a:xfrm>
-          </p:grpSpPr>
-          <p:sp>
-            <p:nvSpPr>
-              <p:cNvPr id="85" name="箭號: 五邊形 84">
-                <a:extLst>
-                  <a:ext uri="{FF2B5EF4-FFF2-40B4-BE49-F238E27FC236}">
-                    <a16:creationId xmlns:a16="http://schemas.microsoft.com/office/drawing/2014/main" id="{DA773988-E7A8-4773-AF85-6D66FD569966}"/>
-                  </a:ext>
-                </a:extLst>
-              </p:cNvPr>
-              <p:cNvSpPr/>
-              <p:nvPr/>
-            </p:nvSpPr>
-            <p:spPr>
-              <a:xfrm>
-                <a:off x="1350704" y="1725368"/>
-                <a:ext cx="387927" cy="260811"/>
-              </a:xfrm>
-              <a:prstGeom prst="homePlate">
-                <a:avLst/>
-              </a:prstGeom>
-              <a:solidFill>
-                <a:schemeClr val="accent3">
-                  <a:lumMod val="40000"/>
-                  <a:lumOff val="60000"/>
-                </a:schemeClr>
-              </a:solidFill>
-            </p:spPr>
-            <p:style>
-              <a:lnRef idx="2">
-                <a:schemeClr val="accent1">
-                  <a:shade val="50000"/>
-                </a:schemeClr>
-              </a:lnRef>
-              <a:fillRef idx="1">
-                <a:schemeClr val="accent1"/>
-              </a:fillRef>
-              <a:effectRef idx="0">
-                <a:schemeClr val="accent1"/>
-              </a:effectRef>
-              <a:fontRef idx="minor">
-                <a:schemeClr val="lt1"/>
-              </a:fontRef>
-            </p:style>
-            <p:txBody>
-              <a:bodyPr rtlCol="0" anchor="ctr"/>
-              <a:lstStyle/>
-              <a:p>
-                <a:pPr algn="ctr"/>
-                <a:endParaRPr lang="zh-TW" altLang="en-US"/>
-              </a:p>
-            </p:txBody>
-          </p:sp>
-          <p:cxnSp>
-            <p:nvCxnSpPr>
-              <p:cNvPr id="86" name="直線接點 85">
-                <a:extLst>
-                  <a:ext uri="{FF2B5EF4-FFF2-40B4-BE49-F238E27FC236}">
-                    <a16:creationId xmlns:a16="http://schemas.microsoft.com/office/drawing/2014/main" id="{15E34BBF-BEC6-4D83-AEB9-40C170DFFAA4}"/>
-                  </a:ext>
-                </a:extLst>
-              </p:cNvPr>
-              <p:cNvCxnSpPr/>
-              <p:nvPr/>
-            </p:nvCxnSpPr>
-            <p:spPr>
-              <a:xfrm flipH="1">
-                <a:off x="1720167" y="1861995"/>
-                <a:ext cx="999836" cy="1"/>
-              </a:xfrm>
-              <a:prstGeom prst="line">
-                <a:avLst/>
-              </a:prstGeom>
-            </p:spPr>
-            <p:style>
-              <a:lnRef idx="3">
-                <a:schemeClr val="dk1"/>
-              </a:lnRef>
-              <a:fillRef idx="0">
-                <a:schemeClr val="dk1"/>
-              </a:fillRef>
-              <a:effectRef idx="2">
-                <a:schemeClr val="dk1"/>
-              </a:effectRef>
-              <a:fontRef idx="minor">
-                <a:schemeClr val="tx1"/>
-              </a:fontRef>
-            </p:style>
-          </p:cxnSp>
-        </p:grpSp>
-        <p:sp>
-          <p:nvSpPr>
-            <p:cNvPr id="79" name="矩形: 圓角 78">
-              <a:extLst>
-                <a:ext uri="{FF2B5EF4-FFF2-40B4-BE49-F238E27FC236}">
-                  <a16:creationId xmlns:a16="http://schemas.microsoft.com/office/drawing/2014/main" id="{B8D2BC12-5C46-4274-B263-214B9FEF1403}"/>
-                </a:ext>
-              </a:extLst>
-            </p:cNvPr>
-            <p:cNvSpPr/>
-            <p:nvPr/>
-          </p:nvSpPr>
-          <p:spPr>
-            <a:xfrm>
-              <a:off x="2756630" y="1115891"/>
-              <a:ext cx="2985336" cy="4776357"/>
-            </a:xfrm>
-            <a:prstGeom prst="roundRect">
-              <a:avLst/>
-            </a:prstGeom>
-            <a:solidFill>
-              <a:srgbClr val="FFC000"/>
-            </a:solidFill>
-            <a:ln w="38100">
-              <a:solidFill>
-                <a:schemeClr val="accent4">
-                  <a:lumMod val="50000"/>
-                </a:schemeClr>
-              </a:solidFill>
-            </a:ln>
-          </p:spPr>
-          <p:style>
-            <a:lnRef idx="2">
-              <a:schemeClr val="accent1">
-                <a:shade val="50000"/>
-              </a:schemeClr>
-            </a:lnRef>
-            <a:fillRef idx="1">
-              <a:schemeClr val="accent1"/>
-            </a:fillRef>
-            <a:effectRef idx="0">
-              <a:schemeClr val="accent1"/>
-            </a:effectRef>
-            <a:fontRef idx="minor">
-              <a:schemeClr val="lt1"/>
-            </a:fontRef>
-          </p:style>
-          <p:txBody>
-            <a:bodyPr rtlCol="0" anchor="ctr"/>
-            <a:lstStyle/>
-            <a:p>
-              <a:pPr algn="ctr"/>
-              <a:endParaRPr lang="zh-TW" altLang="en-US" dirty="0"/>
-            </a:p>
-          </p:txBody>
-        </p:sp>
-        <p:sp>
-          <p:nvSpPr>
-            <p:cNvPr id="80" name="文字方塊 79">
-              <a:extLst>
-                <a:ext uri="{FF2B5EF4-FFF2-40B4-BE49-F238E27FC236}">
-                  <a16:creationId xmlns:a16="http://schemas.microsoft.com/office/drawing/2014/main" id="{70D95985-F48B-4440-960F-D32265F3582B}"/>
-                </a:ext>
-              </a:extLst>
-            </p:cNvPr>
-            <p:cNvSpPr txBox="1"/>
-            <p:nvPr/>
-          </p:nvSpPr>
-          <p:spPr>
-            <a:xfrm>
-              <a:off x="3525253" y="1270631"/>
-              <a:ext cx="1448089" cy="369332"/>
-            </a:xfrm>
-            <a:prstGeom prst="rect">
-              <a:avLst/>
-            </a:prstGeom>
-            <a:solidFill>
-              <a:schemeClr val="accent3">
-                <a:lumMod val="40000"/>
-                <a:lumOff val="60000"/>
-              </a:schemeClr>
-            </a:solidFill>
-            <a:ln>
-              <a:solidFill>
-                <a:schemeClr val="tx1"/>
-              </a:solidFill>
-            </a:ln>
-          </p:spPr>
-          <p:txBody>
-            <a:bodyPr wrap="none" rtlCol="0">
-              <a:spAutoFit/>
-            </a:bodyPr>
-            <a:lstStyle/>
-            <a:p>
-              <a:r>
-                <a:rPr lang="en-US" altLang="zh-TW" dirty="0" err="1"/>
-                <a:t>Main_control</a:t>
-              </a:r>
-              <a:endParaRPr lang="zh-TW" altLang="en-US" dirty="0"/>
-            </a:p>
-          </p:txBody>
-        </p:sp>
-        <p:grpSp>
-          <p:nvGrpSpPr>
-            <p:cNvPr id="81" name="群組 80">
-              <a:extLst>
-                <a:ext uri="{FF2B5EF4-FFF2-40B4-BE49-F238E27FC236}">
-                  <a16:creationId xmlns:a16="http://schemas.microsoft.com/office/drawing/2014/main" id="{501796A1-B91D-4CAE-B14D-2CCE92C76FDA}"/>
-                </a:ext>
-              </a:extLst>
-            </p:cNvPr>
-            <p:cNvGrpSpPr/>
-            <p:nvPr/>
-          </p:nvGrpSpPr>
-          <p:grpSpPr>
-            <a:xfrm>
-              <a:off x="1379795" y="5043096"/>
-              <a:ext cx="1369299" cy="260811"/>
-              <a:chOff x="1350704" y="1725368"/>
-              <a:chExt cx="1369299" cy="260811"/>
-            </a:xfrm>
-          </p:grpSpPr>
-          <p:sp>
-            <p:nvSpPr>
-              <p:cNvPr id="82" name="箭號: 五邊形 81">
-                <a:extLst>
-                  <a:ext uri="{FF2B5EF4-FFF2-40B4-BE49-F238E27FC236}">
-                    <a16:creationId xmlns:a16="http://schemas.microsoft.com/office/drawing/2014/main" id="{9447865E-0AA7-4856-8371-1AB9F990A186}"/>
-                  </a:ext>
-                </a:extLst>
-              </p:cNvPr>
-              <p:cNvSpPr/>
-              <p:nvPr/>
-            </p:nvSpPr>
-            <p:spPr>
-              <a:xfrm>
-                <a:off x="1350704" y="1725368"/>
-                <a:ext cx="387927" cy="260811"/>
-              </a:xfrm>
-              <a:prstGeom prst="homePlate">
-                <a:avLst/>
-              </a:prstGeom>
-              <a:solidFill>
-                <a:schemeClr val="accent3">
-                  <a:lumMod val="40000"/>
-                  <a:lumOff val="60000"/>
-                </a:schemeClr>
-              </a:solidFill>
-            </p:spPr>
-            <p:style>
-              <a:lnRef idx="2">
-                <a:schemeClr val="accent1">
-                  <a:shade val="50000"/>
-                </a:schemeClr>
-              </a:lnRef>
-              <a:fillRef idx="1">
-                <a:schemeClr val="accent1"/>
-              </a:fillRef>
-              <a:effectRef idx="0">
-                <a:schemeClr val="accent1"/>
-              </a:effectRef>
-              <a:fontRef idx="minor">
-                <a:schemeClr val="lt1"/>
-              </a:fontRef>
-            </p:style>
-            <p:txBody>
-              <a:bodyPr rtlCol="0" anchor="ctr"/>
-              <a:lstStyle/>
-              <a:p>
-                <a:pPr algn="ctr"/>
-                <a:endParaRPr lang="zh-TW" altLang="en-US"/>
-              </a:p>
-            </p:txBody>
-          </p:sp>
-          <p:cxnSp>
-            <p:nvCxnSpPr>
-              <p:cNvPr id="83" name="直線接點 82">
-                <a:extLst>
-                  <a:ext uri="{FF2B5EF4-FFF2-40B4-BE49-F238E27FC236}">
-                    <a16:creationId xmlns:a16="http://schemas.microsoft.com/office/drawing/2014/main" id="{F41B9D02-352C-4499-B248-95F93E284A7D}"/>
-                  </a:ext>
-                </a:extLst>
-              </p:cNvPr>
-              <p:cNvCxnSpPr/>
-              <p:nvPr/>
-            </p:nvCxnSpPr>
-            <p:spPr>
-              <a:xfrm flipH="1">
-                <a:off x="1720167" y="1861995"/>
-                <a:ext cx="999836" cy="1"/>
-              </a:xfrm>
-              <a:prstGeom prst="line">
-                <a:avLst/>
-              </a:prstGeom>
-            </p:spPr>
-            <p:style>
-              <a:lnRef idx="3">
-                <a:schemeClr val="dk1"/>
-              </a:lnRef>
-              <a:fillRef idx="0">
-                <a:schemeClr val="dk1"/>
-              </a:fillRef>
-              <a:effectRef idx="2">
-                <a:schemeClr val="dk1"/>
-              </a:effectRef>
-              <a:fontRef idx="minor">
-                <a:schemeClr val="tx1"/>
-              </a:fontRef>
-            </p:style>
-          </p:cxnSp>
-        </p:grpSp>
-      </p:grpSp>
-      <p:sp>
-        <p:nvSpPr>
-          <p:cNvPr id="124" name="文字方塊 123">
-            <a:extLst>
-              <a:ext uri="{FF2B5EF4-FFF2-40B4-BE49-F238E27FC236}">
-                <a16:creationId xmlns:a16="http://schemas.microsoft.com/office/drawing/2014/main" id="{24716D23-1102-415A-ADE5-3BB46B0F1F84}"/>
-              </a:ext>
-            </a:extLst>
-          </p:cNvPr>
-          <p:cNvSpPr txBox="1"/>
-          <p:nvPr/>
-        </p:nvSpPr>
-        <p:spPr>
-          <a:xfrm>
-            <a:off x="1659864" y="2768468"/>
-            <a:ext cx="744114" cy="276999"/>
-          </a:xfrm>
-          <a:prstGeom prst="rect">
-            <a:avLst/>
-          </a:prstGeom>
-          <a:noFill/>
-        </p:spPr>
-        <p:txBody>
-          <a:bodyPr wrap="none" rtlCol="0">
-            <a:spAutoFit/>
-          </a:bodyPr>
-          <a:lstStyle/>
-          <a:p>
-            <a:r>
-              <a:rPr lang="en-US" altLang="zh-TW" sz="1200" dirty="0" err="1"/>
-              <a:t>Rd_done</a:t>
-            </a:r>
-            <a:endParaRPr lang="en-US" altLang="zh-TW" sz="1200" dirty="0"/>
-          </a:p>
-        </p:txBody>
-      </p:sp>
-    </p:spTree>
-    <p:extLst>
-      <p:ext uri="{BB962C8B-B14F-4D97-AF65-F5344CB8AC3E}">
-        <p14:creationId xmlns:p14="http://schemas.microsoft.com/office/powerpoint/2010/main" val="758888369"/>
-      </p:ext>
-    </p:extLst>
-  </p:cSld>
-  <p:clrMapOvr>
-    <a:masterClrMapping/>
-  </p:clrMapOvr>
-</p:sld>
-</file>
-
 <file path=ppt/theme/theme1.xml><?xml version="1.0" encoding="utf-8"?>
 <a:theme xmlns:a="http://schemas.openxmlformats.org/drawingml/2006/main" name="Office 佈景主題">
   <a:themeElements>

</xml_diff>